<commit_message>
POL & Kann-Liste Vorbereitung
</commit_message>
<xml_diff>
--- a/Ausbildung/Procedural Generation/ProceduralGeneration.pptx
+++ b/Ausbildung/Procedural Generation/ProceduralGeneration.pptx
@@ -4,9 +4,18 @@
   <p:sldMasterIdLst>
     <p:sldMasterId id="2147483648" r:id="rId1"/>
   </p:sldMasterIdLst>
+  <p:notesMasterIdLst>
+    <p:notesMasterId r:id="rId10"/>
+  </p:notesMasterIdLst>
   <p:sldIdLst>
     <p:sldId id="256" r:id="rId2"/>
     <p:sldId id="257" r:id="rId3"/>
+    <p:sldId id="258" r:id="rId4"/>
+    <p:sldId id="259" r:id="rId5"/>
+    <p:sldId id="260" r:id="rId6"/>
+    <p:sldId id="261" r:id="rId7"/>
+    <p:sldId id="262" r:id="rId8"/>
+    <p:sldId id="263" r:id="rId9"/>
   </p:sldIdLst>
   <p:sldSz cx="12192000" cy="6858000"/>
   <p:notesSz cx="6858000" cy="9144000"/>
@@ -105,7 +114,529 @@
       </a:defRPr>
     </a:lvl9pPr>
   </p:defaultTextStyle>
+  <p:extLst>
+    <p:ext uri="{EFAFB233-063F-42B5-8137-9DF3F51BA10A}">
+      <p15:sldGuideLst xmlns:p15="http://schemas.microsoft.com/office/powerpoint/2012/main"/>
+    </p:ext>
+  </p:extLst>
 </p:presentation>
+</file>
+
+<file path=ppt/notesMasters/notesMaster1.xml><?xml version="1.0" encoding="utf-8"?>
+<p:notesMaster xmlns:a="http://schemas.openxmlformats.org/drawingml/2006/main" xmlns:r="http://schemas.openxmlformats.org/officeDocument/2006/relationships" xmlns:p="http://schemas.openxmlformats.org/presentationml/2006/main">
+  <p:cSld>
+    <p:bg>
+      <p:bgRef idx="1001">
+        <a:schemeClr val="bg1"/>
+      </p:bgRef>
+    </p:bg>
+    <p:spTree>
+      <p:nvGrpSpPr>
+        <p:cNvPr id="1" name=""/>
+        <p:cNvGrpSpPr/>
+        <p:nvPr/>
+      </p:nvGrpSpPr>
+      <p:grpSpPr>
+        <a:xfrm>
+          <a:off x="0" y="0"/>
+          <a:ext cx="0" cy="0"/>
+          <a:chOff x="0" y="0"/>
+          <a:chExt cx="0" cy="0"/>
+        </a:xfrm>
+      </p:grpSpPr>
+      <p:sp>
+        <p:nvSpPr>
+          <p:cNvPr id="2" name="Kopfzeilenplatzhalter 1"/>
+          <p:cNvSpPr>
+            <a:spLocks noGrp="1"/>
+          </p:cNvSpPr>
+          <p:nvPr>
+            <p:ph type="hdr" sz="quarter"/>
+          </p:nvPr>
+        </p:nvSpPr>
+        <p:spPr>
+          <a:xfrm>
+            <a:off x="0" y="0"/>
+            <a:ext cx="2971800" cy="458788"/>
+          </a:xfrm>
+          <a:prstGeom prst="rect">
+            <a:avLst/>
+          </a:prstGeom>
+        </p:spPr>
+        <p:txBody>
+          <a:bodyPr vert="horz" lIns="91440" tIns="45720" rIns="91440" bIns="45720" rtlCol="0"/>
+          <a:lstStyle>
+            <a:lvl1pPr algn="l">
+              <a:defRPr sz="1200"/>
+            </a:lvl1pPr>
+          </a:lstStyle>
+          <a:p>
+            <a:endParaRPr lang="de-DE"/>
+          </a:p>
+        </p:txBody>
+      </p:sp>
+      <p:sp>
+        <p:nvSpPr>
+          <p:cNvPr id="3" name="Datumsplatzhalter 2"/>
+          <p:cNvSpPr>
+            <a:spLocks noGrp="1"/>
+          </p:cNvSpPr>
+          <p:nvPr>
+            <p:ph type="dt" idx="1"/>
+          </p:nvPr>
+        </p:nvSpPr>
+        <p:spPr>
+          <a:xfrm>
+            <a:off x="3884613" y="0"/>
+            <a:ext cx="2971800" cy="458788"/>
+          </a:xfrm>
+          <a:prstGeom prst="rect">
+            <a:avLst/>
+          </a:prstGeom>
+        </p:spPr>
+        <p:txBody>
+          <a:bodyPr vert="horz" lIns="91440" tIns="45720" rIns="91440" bIns="45720" rtlCol="0"/>
+          <a:lstStyle>
+            <a:lvl1pPr algn="r">
+              <a:defRPr sz="1200"/>
+            </a:lvl1pPr>
+          </a:lstStyle>
+          <a:p>
+            <a:fld id="{9F1ECEC5-0953-42CA-B2B1-3CA90789FEB0}" type="datetimeFigureOut">
+              <a:rPr lang="de-DE" smtClean="0"/>
+              <a:t>27.09.2024</a:t>
+            </a:fld>
+            <a:endParaRPr lang="de-DE"/>
+          </a:p>
+        </p:txBody>
+      </p:sp>
+      <p:sp>
+        <p:nvSpPr>
+          <p:cNvPr id="4" name="Folienbildplatzhalter 3"/>
+          <p:cNvSpPr>
+            <a:spLocks noGrp="1" noRot="1" noChangeAspect="1"/>
+          </p:cNvSpPr>
+          <p:nvPr>
+            <p:ph type="sldImg" idx="2"/>
+          </p:nvPr>
+        </p:nvSpPr>
+        <p:spPr>
+          <a:xfrm>
+            <a:off x="685800" y="1143000"/>
+            <a:ext cx="5486400" cy="3086100"/>
+          </a:xfrm>
+          <a:prstGeom prst="rect">
+            <a:avLst/>
+          </a:prstGeom>
+          <a:noFill/>
+          <a:ln w="12700">
+            <a:solidFill>
+              <a:prstClr val="black"/>
+            </a:solidFill>
+          </a:ln>
+        </p:spPr>
+        <p:txBody>
+          <a:bodyPr vert="horz" lIns="91440" tIns="45720" rIns="91440" bIns="45720" rtlCol="0" anchor="ctr"/>
+          <a:lstStyle/>
+          <a:p>
+            <a:endParaRPr lang="de-DE"/>
+          </a:p>
+        </p:txBody>
+      </p:sp>
+      <p:sp>
+        <p:nvSpPr>
+          <p:cNvPr id="5" name="Notizenplatzhalter 4"/>
+          <p:cNvSpPr>
+            <a:spLocks noGrp="1"/>
+          </p:cNvSpPr>
+          <p:nvPr>
+            <p:ph type="body" sz="quarter" idx="3"/>
+          </p:nvPr>
+        </p:nvSpPr>
+        <p:spPr>
+          <a:xfrm>
+            <a:off x="685800" y="4400550"/>
+            <a:ext cx="5486400" cy="3600450"/>
+          </a:xfrm>
+          <a:prstGeom prst="rect">
+            <a:avLst/>
+          </a:prstGeom>
+        </p:spPr>
+        <p:txBody>
+          <a:bodyPr vert="horz" lIns="91440" tIns="45720" rIns="91440" bIns="45720" rtlCol="0"/>
+          <a:lstStyle/>
+          <a:p>
+            <a:pPr lvl="0"/>
+            <a:r>
+              <a:rPr lang="de-DE"/>
+              <a:t>Mastertextformat bearbeiten</a:t>
+            </a:r>
+          </a:p>
+          <a:p>
+            <a:pPr lvl="1"/>
+            <a:r>
+              <a:rPr lang="de-DE"/>
+              <a:t>Zweite Ebene</a:t>
+            </a:r>
+          </a:p>
+          <a:p>
+            <a:pPr lvl="2"/>
+            <a:r>
+              <a:rPr lang="de-DE"/>
+              <a:t>Dritte Ebene</a:t>
+            </a:r>
+          </a:p>
+          <a:p>
+            <a:pPr lvl="3"/>
+            <a:r>
+              <a:rPr lang="de-DE"/>
+              <a:t>Vierte Ebene</a:t>
+            </a:r>
+          </a:p>
+          <a:p>
+            <a:pPr lvl="4"/>
+            <a:r>
+              <a:rPr lang="de-DE"/>
+              <a:t>Fünfte Ebene</a:t>
+            </a:r>
+          </a:p>
+        </p:txBody>
+      </p:sp>
+      <p:sp>
+        <p:nvSpPr>
+          <p:cNvPr id="6" name="Fußzeilenplatzhalter 5"/>
+          <p:cNvSpPr>
+            <a:spLocks noGrp="1"/>
+          </p:cNvSpPr>
+          <p:nvPr>
+            <p:ph type="ftr" sz="quarter" idx="4"/>
+          </p:nvPr>
+        </p:nvSpPr>
+        <p:spPr>
+          <a:xfrm>
+            <a:off x="0" y="8685213"/>
+            <a:ext cx="2971800" cy="458787"/>
+          </a:xfrm>
+          <a:prstGeom prst="rect">
+            <a:avLst/>
+          </a:prstGeom>
+        </p:spPr>
+        <p:txBody>
+          <a:bodyPr vert="horz" lIns="91440" tIns="45720" rIns="91440" bIns="45720" rtlCol="0" anchor="b"/>
+          <a:lstStyle>
+            <a:lvl1pPr algn="l">
+              <a:defRPr sz="1200"/>
+            </a:lvl1pPr>
+          </a:lstStyle>
+          <a:p>
+            <a:endParaRPr lang="de-DE"/>
+          </a:p>
+        </p:txBody>
+      </p:sp>
+      <p:sp>
+        <p:nvSpPr>
+          <p:cNvPr id="7" name="Foliennummernplatzhalter 6"/>
+          <p:cNvSpPr>
+            <a:spLocks noGrp="1"/>
+          </p:cNvSpPr>
+          <p:nvPr>
+            <p:ph type="sldNum" sz="quarter" idx="5"/>
+          </p:nvPr>
+        </p:nvSpPr>
+        <p:spPr>
+          <a:xfrm>
+            <a:off x="3884613" y="8685213"/>
+            <a:ext cx="2971800" cy="458787"/>
+          </a:xfrm>
+          <a:prstGeom prst="rect">
+            <a:avLst/>
+          </a:prstGeom>
+        </p:spPr>
+        <p:txBody>
+          <a:bodyPr vert="horz" lIns="91440" tIns="45720" rIns="91440" bIns="45720" rtlCol="0" anchor="b"/>
+          <a:lstStyle>
+            <a:lvl1pPr algn="r">
+              <a:defRPr sz="1200"/>
+            </a:lvl1pPr>
+          </a:lstStyle>
+          <a:p>
+            <a:fld id="{6F5581ED-45DB-426F-B772-02DE45128D35}" type="slidenum">
+              <a:rPr lang="de-DE" smtClean="0"/>
+              <a:t>‹Nr.›</a:t>
+            </a:fld>
+            <a:endParaRPr lang="de-DE"/>
+          </a:p>
+        </p:txBody>
+      </p:sp>
+    </p:spTree>
+    <p:extLst>
+      <p:ext uri="{BB962C8B-B14F-4D97-AF65-F5344CB8AC3E}">
+        <p14:creationId xmlns:p14="http://schemas.microsoft.com/office/powerpoint/2010/main" val="453516089"/>
+      </p:ext>
+    </p:extLst>
+  </p:cSld>
+  <p:clrMap bg1="lt1" tx1="dk1" bg2="lt2" tx2="dk2" accent1="accent1" accent2="accent2" accent3="accent3" accent4="accent4" accent5="accent5" accent6="accent6" hlink="hlink" folHlink="folHlink"/>
+  <p:notesStyle>
+    <a:lvl1pPr marL="0" algn="l" defTabSz="914400" rtl="0" eaLnBrk="1" latinLnBrk="0" hangingPunct="1">
+      <a:defRPr sz="1200" kern="1200">
+        <a:solidFill>
+          <a:schemeClr val="tx1"/>
+        </a:solidFill>
+        <a:latin typeface="+mn-lt"/>
+        <a:ea typeface="+mn-ea"/>
+        <a:cs typeface="+mn-cs"/>
+      </a:defRPr>
+    </a:lvl1pPr>
+    <a:lvl2pPr marL="457200" algn="l" defTabSz="914400" rtl="0" eaLnBrk="1" latinLnBrk="0" hangingPunct="1">
+      <a:defRPr sz="1200" kern="1200">
+        <a:solidFill>
+          <a:schemeClr val="tx1"/>
+        </a:solidFill>
+        <a:latin typeface="+mn-lt"/>
+        <a:ea typeface="+mn-ea"/>
+        <a:cs typeface="+mn-cs"/>
+      </a:defRPr>
+    </a:lvl2pPr>
+    <a:lvl3pPr marL="914400" algn="l" defTabSz="914400" rtl="0" eaLnBrk="1" latinLnBrk="0" hangingPunct="1">
+      <a:defRPr sz="1200" kern="1200">
+        <a:solidFill>
+          <a:schemeClr val="tx1"/>
+        </a:solidFill>
+        <a:latin typeface="+mn-lt"/>
+        <a:ea typeface="+mn-ea"/>
+        <a:cs typeface="+mn-cs"/>
+      </a:defRPr>
+    </a:lvl3pPr>
+    <a:lvl4pPr marL="1371600" algn="l" defTabSz="914400" rtl="0" eaLnBrk="1" latinLnBrk="0" hangingPunct="1">
+      <a:defRPr sz="1200" kern="1200">
+        <a:solidFill>
+          <a:schemeClr val="tx1"/>
+        </a:solidFill>
+        <a:latin typeface="+mn-lt"/>
+        <a:ea typeface="+mn-ea"/>
+        <a:cs typeface="+mn-cs"/>
+      </a:defRPr>
+    </a:lvl4pPr>
+    <a:lvl5pPr marL="1828800" algn="l" defTabSz="914400" rtl="0" eaLnBrk="1" latinLnBrk="0" hangingPunct="1">
+      <a:defRPr sz="1200" kern="1200">
+        <a:solidFill>
+          <a:schemeClr val="tx1"/>
+        </a:solidFill>
+        <a:latin typeface="+mn-lt"/>
+        <a:ea typeface="+mn-ea"/>
+        <a:cs typeface="+mn-cs"/>
+      </a:defRPr>
+    </a:lvl5pPr>
+    <a:lvl6pPr marL="2286000" algn="l" defTabSz="914400" rtl="0" eaLnBrk="1" latinLnBrk="0" hangingPunct="1">
+      <a:defRPr sz="1200" kern="1200">
+        <a:solidFill>
+          <a:schemeClr val="tx1"/>
+        </a:solidFill>
+        <a:latin typeface="+mn-lt"/>
+        <a:ea typeface="+mn-ea"/>
+        <a:cs typeface="+mn-cs"/>
+      </a:defRPr>
+    </a:lvl6pPr>
+    <a:lvl7pPr marL="2743200" algn="l" defTabSz="914400" rtl="0" eaLnBrk="1" latinLnBrk="0" hangingPunct="1">
+      <a:defRPr sz="1200" kern="1200">
+        <a:solidFill>
+          <a:schemeClr val="tx1"/>
+        </a:solidFill>
+        <a:latin typeface="+mn-lt"/>
+        <a:ea typeface="+mn-ea"/>
+        <a:cs typeface="+mn-cs"/>
+      </a:defRPr>
+    </a:lvl7pPr>
+    <a:lvl8pPr marL="3200400" algn="l" defTabSz="914400" rtl="0" eaLnBrk="1" latinLnBrk="0" hangingPunct="1">
+      <a:defRPr sz="1200" kern="1200">
+        <a:solidFill>
+          <a:schemeClr val="tx1"/>
+        </a:solidFill>
+        <a:latin typeface="+mn-lt"/>
+        <a:ea typeface="+mn-ea"/>
+        <a:cs typeface="+mn-cs"/>
+      </a:defRPr>
+    </a:lvl8pPr>
+    <a:lvl9pPr marL="3657600" algn="l" defTabSz="914400" rtl="0" eaLnBrk="1" latinLnBrk="0" hangingPunct="1">
+      <a:defRPr sz="1200" kern="1200">
+        <a:solidFill>
+          <a:schemeClr val="tx1"/>
+        </a:solidFill>
+        <a:latin typeface="+mn-lt"/>
+        <a:ea typeface="+mn-ea"/>
+        <a:cs typeface="+mn-cs"/>
+      </a:defRPr>
+    </a:lvl9pPr>
+  </p:notesStyle>
+</p:notesMaster>
+</file>
+
+<file path=ppt/notesSlides/notesSlide1.xml><?xml version="1.0" encoding="utf-8"?>
+<p:notes xmlns:a="http://schemas.openxmlformats.org/drawingml/2006/main" xmlns:r="http://schemas.openxmlformats.org/officeDocument/2006/relationships" xmlns:p="http://schemas.openxmlformats.org/presentationml/2006/main">
+  <p:cSld>
+    <p:spTree>
+      <p:nvGrpSpPr>
+        <p:cNvPr id="1" name=""/>
+        <p:cNvGrpSpPr/>
+        <p:nvPr/>
+      </p:nvGrpSpPr>
+      <p:grpSpPr>
+        <a:xfrm>
+          <a:off x="0" y="0"/>
+          <a:ext cx="0" cy="0"/>
+          <a:chOff x="0" y="0"/>
+          <a:chExt cx="0" cy="0"/>
+        </a:xfrm>
+      </p:grpSpPr>
+      <p:sp>
+        <p:nvSpPr>
+          <p:cNvPr id="2" name="Folienbildplatzhalter 1"/>
+          <p:cNvSpPr>
+            <a:spLocks noGrp="1" noRot="1" noChangeAspect="1"/>
+          </p:cNvSpPr>
+          <p:nvPr>
+            <p:ph type="sldImg"/>
+          </p:nvPr>
+        </p:nvSpPr>
+        <p:spPr/>
+      </p:sp>
+      <p:sp>
+        <p:nvSpPr>
+          <p:cNvPr id="3" name="Notizenplatzhalter 2"/>
+          <p:cNvSpPr>
+            <a:spLocks noGrp="1"/>
+          </p:cNvSpPr>
+          <p:nvPr>
+            <p:ph type="body" idx="1"/>
+          </p:nvPr>
+        </p:nvSpPr>
+        <p:spPr/>
+        <p:txBody>
+          <a:bodyPr/>
+          <a:lstStyle/>
+          <a:p>
+            <a:endParaRPr lang="de-DE"/>
+          </a:p>
+        </p:txBody>
+      </p:sp>
+      <p:sp>
+        <p:nvSpPr>
+          <p:cNvPr id="4" name="Foliennummernplatzhalter 3"/>
+          <p:cNvSpPr>
+            <a:spLocks noGrp="1"/>
+          </p:cNvSpPr>
+          <p:nvPr>
+            <p:ph type="sldNum" sz="quarter" idx="5"/>
+          </p:nvPr>
+        </p:nvSpPr>
+        <p:spPr/>
+        <p:txBody>
+          <a:bodyPr/>
+          <a:lstStyle/>
+          <a:p>
+            <a:fld id="{6F5581ED-45DB-426F-B772-02DE45128D35}" type="slidenum">
+              <a:rPr lang="de-DE" smtClean="0"/>
+              <a:t>6</a:t>
+            </a:fld>
+            <a:endParaRPr lang="de-DE"/>
+          </a:p>
+        </p:txBody>
+      </p:sp>
+    </p:spTree>
+    <p:extLst>
+      <p:ext uri="{BB962C8B-B14F-4D97-AF65-F5344CB8AC3E}">
+        <p14:creationId xmlns:p14="http://schemas.microsoft.com/office/powerpoint/2010/main" val="2350001090"/>
+      </p:ext>
+    </p:extLst>
+  </p:cSld>
+  <p:clrMapOvr>
+    <a:masterClrMapping/>
+  </p:clrMapOvr>
+</p:notes>
+</file>
+
+<file path=ppt/notesSlides/notesSlide2.xml><?xml version="1.0" encoding="utf-8"?>
+<p:notes xmlns:a="http://schemas.openxmlformats.org/drawingml/2006/main" xmlns:r="http://schemas.openxmlformats.org/officeDocument/2006/relationships" xmlns:p="http://schemas.openxmlformats.org/presentationml/2006/main">
+  <p:cSld>
+    <p:spTree>
+      <p:nvGrpSpPr>
+        <p:cNvPr id="1" name=""/>
+        <p:cNvGrpSpPr/>
+        <p:nvPr/>
+      </p:nvGrpSpPr>
+      <p:grpSpPr>
+        <a:xfrm>
+          <a:off x="0" y="0"/>
+          <a:ext cx="0" cy="0"/>
+          <a:chOff x="0" y="0"/>
+          <a:chExt cx="0" cy="0"/>
+        </a:xfrm>
+      </p:grpSpPr>
+      <p:sp>
+        <p:nvSpPr>
+          <p:cNvPr id="2" name="Folienbildplatzhalter 1"/>
+          <p:cNvSpPr>
+            <a:spLocks noGrp="1" noRot="1" noChangeAspect="1"/>
+          </p:cNvSpPr>
+          <p:nvPr>
+            <p:ph type="sldImg"/>
+          </p:nvPr>
+        </p:nvSpPr>
+        <p:spPr/>
+      </p:sp>
+      <p:sp>
+        <p:nvSpPr>
+          <p:cNvPr id="3" name="Notizenplatzhalter 2"/>
+          <p:cNvSpPr>
+            <a:spLocks noGrp="1"/>
+          </p:cNvSpPr>
+          <p:nvPr>
+            <p:ph type="body" idx="1"/>
+          </p:nvPr>
+        </p:nvSpPr>
+        <p:spPr/>
+        <p:txBody>
+          <a:bodyPr/>
+          <a:lstStyle/>
+          <a:p>
+            <a:endParaRPr lang="de-DE"/>
+          </a:p>
+        </p:txBody>
+      </p:sp>
+      <p:sp>
+        <p:nvSpPr>
+          <p:cNvPr id="4" name="Foliennummernplatzhalter 3"/>
+          <p:cNvSpPr>
+            <a:spLocks noGrp="1"/>
+          </p:cNvSpPr>
+          <p:nvPr>
+            <p:ph type="sldNum" sz="quarter" idx="5"/>
+          </p:nvPr>
+        </p:nvSpPr>
+        <p:spPr/>
+        <p:txBody>
+          <a:bodyPr/>
+          <a:lstStyle/>
+          <a:p>
+            <a:fld id="{6F5581ED-45DB-426F-B772-02DE45128D35}" type="slidenum">
+              <a:rPr lang="de-DE" smtClean="0"/>
+              <a:t>7</a:t>
+            </a:fld>
+            <a:endParaRPr lang="de-DE"/>
+          </a:p>
+        </p:txBody>
+      </p:sp>
+    </p:spTree>
+    <p:extLst>
+      <p:ext uri="{BB962C8B-B14F-4D97-AF65-F5344CB8AC3E}">
+        <p14:creationId xmlns:p14="http://schemas.microsoft.com/office/powerpoint/2010/main" val="519590082"/>
+      </p:ext>
+    </p:extLst>
+  </p:cSld>
+  <p:clrMapOvr>
+    <a:masterClrMapping/>
+  </p:clrMapOvr>
+</p:notes>
 </file>
 
 <file path=ppt/slideLayouts/slideLayout1.xml><?xml version="1.0" encoding="utf-8"?>
@@ -253,9 +784,9 @@
           <a:bodyPr/>
           <a:lstStyle/>
           <a:p>
-            <a:fld id="{4A289078-279B-412D-A07D-B3FA30E0D68D}" type="datetimeFigureOut">
+            <a:fld id="{42C133BC-C123-49D4-8869-73DBE4A9853A}" type="datetime1">
               <a:rPr lang="de-DE" smtClean="0"/>
-              <a:t>23.09.2024</a:t>
+              <a:t>27.09.2024</a:t>
             </a:fld>
             <a:endParaRPr lang="de-DE"/>
           </a:p>
@@ -451,9 +982,9 @@
           <a:bodyPr/>
           <a:lstStyle/>
           <a:p>
-            <a:fld id="{4A289078-279B-412D-A07D-B3FA30E0D68D}" type="datetimeFigureOut">
+            <a:fld id="{3D4B5397-C668-48C2-9D09-196A25250823}" type="datetime1">
               <a:rPr lang="de-DE" smtClean="0"/>
-              <a:t>23.09.2024</a:t>
+              <a:t>27.09.2024</a:t>
             </a:fld>
             <a:endParaRPr lang="de-DE"/>
           </a:p>
@@ -659,9 +1190,9 @@
           <a:bodyPr/>
           <a:lstStyle/>
           <a:p>
-            <a:fld id="{4A289078-279B-412D-A07D-B3FA30E0D68D}" type="datetimeFigureOut">
+            <a:fld id="{E7E7D49F-2B01-4BC7-B5B7-F5DB71BB743D}" type="datetime1">
               <a:rPr lang="de-DE" smtClean="0"/>
-              <a:t>23.09.2024</a:t>
+              <a:t>27.09.2024</a:t>
             </a:fld>
             <a:endParaRPr lang="de-DE"/>
           </a:p>
@@ -857,9 +1388,9 @@
           <a:bodyPr/>
           <a:lstStyle/>
           <a:p>
-            <a:fld id="{4A289078-279B-412D-A07D-B3FA30E0D68D}" type="datetimeFigureOut">
+            <a:fld id="{C62B05E5-7EEC-4084-A326-E2064DD7867A}" type="datetime1">
               <a:rPr lang="de-DE" smtClean="0"/>
-              <a:t>23.09.2024</a:t>
+              <a:t>27.09.2024</a:t>
             </a:fld>
             <a:endParaRPr lang="de-DE"/>
           </a:p>
@@ -1132,9 +1663,9 @@
           <a:bodyPr/>
           <a:lstStyle/>
           <a:p>
-            <a:fld id="{4A289078-279B-412D-A07D-B3FA30E0D68D}" type="datetimeFigureOut">
+            <a:fld id="{C1B31F18-8B17-4CC9-AC53-FE10580CAE6A}" type="datetime1">
               <a:rPr lang="de-DE" smtClean="0"/>
-              <a:t>23.09.2024</a:t>
+              <a:t>27.09.2024</a:t>
             </a:fld>
             <a:endParaRPr lang="de-DE"/>
           </a:p>
@@ -1397,9 +1928,9 @@
           <a:bodyPr/>
           <a:lstStyle/>
           <a:p>
-            <a:fld id="{4A289078-279B-412D-A07D-B3FA30E0D68D}" type="datetimeFigureOut">
+            <a:fld id="{2A3824BE-276B-4301-B986-032385766996}" type="datetime1">
               <a:rPr lang="de-DE" smtClean="0"/>
-              <a:t>23.09.2024</a:t>
+              <a:t>27.09.2024</a:t>
             </a:fld>
             <a:endParaRPr lang="de-DE"/>
           </a:p>
@@ -1809,9 +2340,9 @@
           <a:bodyPr/>
           <a:lstStyle/>
           <a:p>
-            <a:fld id="{4A289078-279B-412D-A07D-B3FA30E0D68D}" type="datetimeFigureOut">
+            <a:fld id="{53A97FC3-35B1-4891-9DF1-BE3FD55AB673}" type="datetime1">
               <a:rPr lang="de-DE" smtClean="0"/>
-              <a:t>23.09.2024</a:t>
+              <a:t>27.09.2024</a:t>
             </a:fld>
             <a:endParaRPr lang="de-DE"/>
           </a:p>
@@ -1950,9 +2481,9 @@
           <a:bodyPr/>
           <a:lstStyle/>
           <a:p>
-            <a:fld id="{4A289078-279B-412D-A07D-B3FA30E0D68D}" type="datetimeFigureOut">
+            <a:fld id="{B9E70C6C-34F8-401A-A5AB-B54B89353B59}" type="datetime1">
               <a:rPr lang="de-DE" smtClean="0"/>
-              <a:t>23.09.2024</a:t>
+              <a:t>27.09.2024</a:t>
             </a:fld>
             <a:endParaRPr lang="de-DE"/>
           </a:p>
@@ -2063,9 +2594,9 @@
           <a:bodyPr/>
           <a:lstStyle/>
           <a:p>
-            <a:fld id="{4A289078-279B-412D-A07D-B3FA30E0D68D}" type="datetimeFigureOut">
+            <a:fld id="{05D78981-1E40-4091-B4F9-A4CF9C729553}" type="datetime1">
               <a:rPr lang="de-DE" smtClean="0"/>
-              <a:t>23.09.2024</a:t>
+              <a:t>27.09.2024</a:t>
             </a:fld>
             <a:endParaRPr lang="de-DE"/>
           </a:p>
@@ -2374,9 +2905,9 @@
           <a:bodyPr/>
           <a:lstStyle/>
           <a:p>
-            <a:fld id="{4A289078-279B-412D-A07D-B3FA30E0D68D}" type="datetimeFigureOut">
+            <a:fld id="{825CBFA1-6038-4CE7-AA27-E42CD035ECDC}" type="datetime1">
               <a:rPr lang="de-DE" smtClean="0"/>
-              <a:t>23.09.2024</a:t>
+              <a:t>27.09.2024</a:t>
             </a:fld>
             <a:endParaRPr lang="de-DE"/>
           </a:p>
@@ -2662,9 +3193,9 @@
           <a:bodyPr/>
           <a:lstStyle/>
           <a:p>
-            <a:fld id="{4A289078-279B-412D-A07D-B3FA30E0D68D}" type="datetimeFigureOut">
+            <a:fld id="{BB3DFB82-6670-40D9-86B9-13457839F6E9}" type="datetime1">
               <a:rPr lang="de-DE" smtClean="0"/>
-              <a:t>23.09.2024</a:t>
+              <a:t>27.09.2024</a:t>
             </a:fld>
             <a:endParaRPr lang="de-DE"/>
           </a:p>
@@ -2903,9 +3434,9 @@
             </a:lvl1pPr>
           </a:lstStyle>
           <a:p>
-            <a:fld id="{4A289078-279B-412D-A07D-B3FA30E0D68D}" type="datetimeFigureOut">
+            <a:fld id="{80881343-16B3-4939-A9B1-6FD765FE9F53}" type="datetime1">
               <a:rPr lang="de-DE" smtClean="0"/>
-              <a:t>23.09.2024</a:t>
+              <a:t>27.09.2024</a:t>
             </a:fld>
             <a:endParaRPr lang="de-DE"/>
           </a:p>
@@ -3022,6 +3553,7 @@
     <p:sldLayoutId id="2147483658" r:id="rId10"/>
     <p:sldLayoutId id="2147483659" r:id="rId11"/>
   </p:sldLayoutIdLst>
+  <p:hf hdr="0" ftr="0" dt="0"/>
   <p:txStyles>
     <p:titleStyle>
       <a:lvl1pPr algn="l" defTabSz="914400" rtl="0" eaLnBrk="1" latinLnBrk="0" hangingPunct="1">
@@ -3380,6 +3912,35 @@
           </a:p>
         </p:txBody>
       </p:sp>
+      <p:sp>
+        <p:nvSpPr>
+          <p:cNvPr id="4" name="Foliennummernplatzhalter 3">
+            <a:extLst>
+              <a:ext uri="{FF2B5EF4-FFF2-40B4-BE49-F238E27FC236}">
+                <a16:creationId xmlns:a16="http://schemas.microsoft.com/office/drawing/2014/main" id="{2F6C9D9D-1F17-6F7F-BB7A-720550A8ECF9}"/>
+              </a:ext>
+            </a:extLst>
+          </p:cNvPr>
+          <p:cNvSpPr>
+            <a:spLocks noGrp="1"/>
+          </p:cNvSpPr>
+          <p:nvPr>
+            <p:ph type="sldNum" sz="quarter" idx="12"/>
+          </p:nvPr>
+        </p:nvSpPr>
+        <p:spPr/>
+        <p:txBody>
+          <a:bodyPr/>
+          <a:lstStyle/>
+          <a:p>
+            <a:fld id="{33B5D9D1-2BFB-4A8A-9782-5B1549F4706E}" type="slidenum">
+              <a:rPr lang="de-DE" smtClean="0"/>
+              <a:t>1</a:t>
+            </a:fld>
+            <a:endParaRPr lang="de-DE"/>
+          </a:p>
+        </p:txBody>
+      </p:sp>
     </p:spTree>
     <p:extLst>
       <p:ext uri="{BB962C8B-B14F-4D97-AF65-F5344CB8AC3E}">
@@ -3508,7 +4069,7 @@
             </a:pPr>
             <a:r>
               <a:rPr lang="de-DE" dirty="0"/>
-              <a:t>Anwendungsbeispiele</a:t>
+              <a:t>Techniken</a:t>
             </a:r>
           </a:p>
           <a:p>
@@ -3518,7 +4079,191 @@
             </a:pPr>
             <a:r>
               <a:rPr lang="de-DE" dirty="0"/>
-              <a:t>Techniken</a:t>
+              <a:t>Grenzen und Schwierigkeiten</a:t>
+            </a:r>
+          </a:p>
+        </p:txBody>
+      </p:sp>
+      <p:pic>
+        <p:nvPicPr>
+          <p:cNvPr id="2050" name="Picture 2" descr="Procedural Generation As The Future">
+            <a:extLst>
+              <a:ext uri="{FF2B5EF4-FFF2-40B4-BE49-F238E27FC236}">
+                <a16:creationId xmlns:a16="http://schemas.microsoft.com/office/drawing/2014/main" id="{677D0E42-2F82-3270-761D-13CF2356C2BE}"/>
+              </a:ext>
+            </a:extLst>
+          </p:cNvPr>
+          <p:cNvPicPr>
+            <a:picLocks noChangeAspect="1" noChangeArrowheads="1"/>
+          </p:cNvPicPr>
+          <p:nvPr/>
+        </p:nvPicPr>
+        <p:blipFill>
+          <a:blip r:embed="rId2">
+            <a:extLst>
+              <a:ext uri="{28A0092B-C50C-407E-A947-70E740481C1C}">
+                <a14:useLocalDpi xmlns:a14="http://schemas.microsoft.com/office/drawing/2010/main" val="0"/>
+              </a:ext>
+            </a:extLst>
+          </a:blip>
+          <a:srcRect/>
+          <a:stretch>
+            <a:fillRect/>
+          </a:stretch>
+        </p:blipFill>
+        <p:spPr bwMode="auto">
+          <a:xfrm rot="10800000">
+            <a:off x="3702573" y="2728533"/>
+            <a:ext cx="9658350" cy="6057900"/>
+          </a:xfrm>
+          <a:prstGeom prst="rect">
+            <a:avLst/>
+          </a:prstGeom>
+          <a:noFill/>
+          <a:effectLst>
+            <a:softEdge rad="1270000"/>
+          </a:effectLst>
+          <a:extLst>
+            <a:ext uri="{909E8E84-426E-40DD-AFC4-6F175D3DCCD1}">
+              <a14:hiddenFill xmlns:a14="http://schemas.microsoft.com/office/drawing/2010/main">
+                <a:solidFill>
+                  <a:srgbClr val="FFFFFF"/>
+                </a:solidFill>
+              </a14:hiddenFill>
+            </a:ext>
+          </a:extLst>
+        </p:spPr>
+      </p:pic>
+      <p:sp>
+        <p:nvSpPr>
+          <p:cNvPr id="4" name="Foliennummernplatzhalter 3">
+            <a:extLst>
+              <a:ext uri="{FF2B5EF4-FFF2-40B4-BE49-F238E27FC236}">
+                <a16:creationId xmlns:a16="http://schemas.microsoft.com/office/drawing/2014/main" id="{FD72E032-E12E-5DCF-1CC2-8D43E15D5871}"/>
+              </a:ext>
+            </a:extLst>
+          </p:cNvPr>
+          <p:cNvSpPr>
+            <a:spLocks noGrp="1"/>
+          </p:cNvSpPr>
+          <p:nvPr>
+            <p:ph type="sldNum" sz="quarter" idx="12"/>
+          </p:nvPr>
+        </p:nvSpPr>
+        <p:spPr/>
+        <p:txBody>
+          <a:bodyPr/>
+          <a:lstStyle/>
+          <a:p>
+            <a:fld id="{33B5D9D1-2BFB-4A8A-9782-5B1549F4706E}" type="slidenum">
+              <a:rPr lang="de-DE" smtClean="0"/>
+              <a:t>2</a:t>
+            </a:fld>
+            <a:endParaRPr lang="de-DE"/>
+          </a:p>
+        </p:txBody>
+      </p:sp>
+    </p:spTree>
+    <p:extLst>
+      <p:ext uri="{BB962C8B-B14F-4D97-AF65-F5344CB8AC3E}">
+        <p14:creationId xmlns:p14="http://schemas.microsoft.com/office/powerpoint/2010/main" val="3657436050"/>
+      </p:ext>
+    </p:extLst>
+  </p:cSld>
+  <p:clrMapOvr>
+    <a:masterClrMapping/>
+  </p:clrMapOvr>
+</p:sld>
+</file>
+
+<file path=ppt/slides/slide3.xml><?xml version="1.0" encoding="utf-8"?>
+<p:sld xmlns:a="http://schemas.openxmlformats.org/drawingml/2006/main" xmlns:r="http://schemas.openxmlformats.org/officeDocument/2006/relationships" xmlns:p="http://schemas.openxmlformats.org/presentationml/2006/main">
+  <p:cSld>
+    <p:spTree>
+      <p:nvGrpSpPr>
+        <p:cNvPr id="1" name=""/>
+        <p:cNvGrpSpPr/>
+        <p:nvPr/>
+      </p:nvGrpSpPr>
+      <p:grpSpPr>
+        <a:xfrm>
+          <a:off x="0" y="0"/>
+          <a:ext cx="0" cy="0"/>
+          <a:chOff x="0" y="0"/>
+          <a:chExt cx="0" cy="0"/>
+        </a:xfrm>
+      </p:grpSpPr>
+      <p:sp>
+        <p:nvSpPr>
+          <p:cNvPr id="2" name="Titel 1">
+            <a:extLst>
+              <a:ext uri="{FF2B5EF4-FFF2-40B4-BE49-F238E27FC236}">
+                <a16:creationId xmlns:a16="http://schemas.microsoft.com/office/drawing/2014/main" id="{7F29FD84-05DE-5325-FE83-7838B9554882}"/>
+              </a:ext>
+            </a:extLst>
+          </p:cNvPr>
+          <p:cNvSpPr>
+            <a:spLocks noGrp="1"/>
+          </p:cNvSpPr>
+          <p:nvPr>
+            <p:ph type="ctrTitle"/>
+          </p:nvPr>
+        </p:nvSpPr>
+        <p:spPr>
+          <a:xfrm>
+            <a:off x="0" y="0"/>
+            <a:ext cx="12192000" cy="1000635"/>
+          </a:xfrm>
+        </p:spPr>
+        <p:txBody>
+          <a:bodyPr/>
+          <a:lstStyle/>
+          <a:p>
+            <a:pPr algn="l"/>
+            <a:r>
+              <a:rPr lang="de-DE">
+                <a:latin typeface="Montserrat" pitchFamily="2" charset="0"/>
+              </a:rPr>
+              <a:t>EINFÜHRUNG</a:t>
+            </a:r>
+            <a:endParaRPr lang="de-DE" dirty="0">
+              <a:latin typeface="Montserrat" pitchFamily="2" charset="0"/>
+            </a:endParaRPr>
+          </a:p>
+        </p:txBody>
+      </p:sp>
+      <p:sp>
+        <p:nvSpPr>
+          <p:cNvPr id="3" name="Untertitel 2">
+            <a:extLst>
+              <a:ext uri="{FF2B5EF4-FFF2-40B4-BE49-F238E27FC236}">
+                <a16:creationId xmlns:a16="http://schemas.microsoft.com/office/drawing/2014/main" id="{05EE19FE-68A3-D7AE-54F3-04813356C8BE}"/>
+              </a:ext>
+            </a:extLst>
+          </p:cNvPr>
+          <p:cNvSpPr>
+            <a:spLocks noGrp="1"/>
+          </p:cNvSpPr>
+          <p:nvPr>
+            <p:ph type="subTitle" idx="1"/>
+          </p:nvPr>
+        </p:nvSpPr>
+        <p:spPr>
+          <a:xfrm>
+            <a:off x="218485" y="1100517"/>
+            <a:ext cx="11595887" cy="5602035"/>
+          </a:xfrm>
+        </p:spPr>
+        <p:txBody>
+          <a:bodyPr>
+            <a:normAutofit lnSpcReduction="10000"/>
+          </a:bodyPr>
+          <a:lstStyle/>
+          <a:p>
+            <a:pPr algn="l"/>
+            <a:r>
+              <a:rPr lang="de-DE"/>
+              <a:t>Prozedurale Generierung ist der Prozess der algorithmischen Erstellung von Daten oder Inhalten, die entweder zufällig oder auf der Grundlage bestimmter Parameter erzeugt werden.</a:t>
             </a:r>
           </a:p>
           <a:p>
@@ -3526,10 +4271,7 @@
               <a:buFont typeface="Wingdings" panose="05000000000000000000" pitchFamily="2" charset="2"/>
               <a:buChar char="§"/>
             </a:pPr>
-            <a:r>
-              <a:rPr lang="de-DE" dirty="0"/>
-              <a:t>Herausforderung und Grenzen</a:t>
-            </a:r>
+            <a:endParaRPr lang="de-DE"/>
           </a:p>
           <a:p>
             <a:pPr marL="342900" indent="-342900" algn="l">
@@ -3538,16 +4280,1851 @@
             </a:pPr>
             <a:r>
               <a:rPr lang="de-DE"/>
-              <a:t>Fazit</a:t>
+              <a:t>Videospiele</a:t>
+            </a:r>
+          </a:p>
+          <a:p>
+            <a:pPr marL="800100" lvl="1" indent="-342900" algn="l">
+              <a:buFont typeface="Wingdings" panose="05000000000000000000" pitchFamily="2" charset="2"/>
+              <a:buChar char="§"/>
+            </a:pPr>
+            <a:r>
+              <a:rPr lang="de-DE"/>
+              <a:t>Terrain-Generierung</a:t>
+            </a:r>
+          </a:p>
+          <a:p>
+            <a:pPr marL="800100" lvl="1" indent="-342900" algn="l">
+              <a:buFont typeface="Wingdings" panose="05000000000000000000" pitchFamily="2" charset="2"/>
+              <a:buChar char="§"/>
+            </a:pPr>
+            <a:r>
+              <a:rPr lang="de-DE"/>
+              <a:t>Level Design</a:t>
+            </a:r>
+          </a:p>
+          <a:p>
+            <a:pPr marL="342900" indent="-342900" algn="l">
+              <a:buFont typeface="Wingdings" panose="05000000000000000000" pitchFamily="2" charset="2"/>
+              <a:buChar char="§"/>
+            </a:pPr>
+            <a:r>
+              <a:rPr lang="de-DE"/>
+              <a:t>Simulationen</a:t>
+            </a:r>
+          </a:p>
+          <a:p>
+            <a:pPr marL="800100" lvl="1" indent="-342900" algn="l">
+              <a:buFont typeface="Wingdings" panose="05000000000000000000" pitchFamily="2" charset="2"/>
+              <a:buChar char="§"/>
+            </a:pPr>
+            <a:r>
+              <a:rPr lang="de-DE"/>
+              <a:t>Wetter Simulationen</a:t>
+            </a:r>
+          </a:p>
+          <a:p>
+            <a:pPr marL="800100" lvl="1" indent="-342900" algn="l">
+              <a:buFont typeface="Wingdings" panose="05000000000000000000" pitchFamily="2" charset="2"/>
+              <a:buChar char="§"/>
+            </a:pPr>
+            <a:r>
+              <a:rPr lang="de-DE"/>
+              <a:t>Verkehrssimulationen</a:t>
+            </a:r>
+          </a:p>
+          <a:p>
+            <a:pPr marL="342900" indent="-342900" algn="l">
+              <a:buFont typeface="Wingdings" panose="05000000000000000000" pitchFamily="2" charset="2"/>
+              <a:buChar char="§"/>
+            </a:pPr>
+            <a:r>
+              <a:rPr lang="de-DE"/>
+              <a:t>Medien</a:t>
+            </a:r>
+          </a:p>
+          <a:p>
+            <a:pPr marL="800100" lvl="1" indent="-342900" algn="l">
+              <a:buFont typeface="Wingdings" panose="05000000000000000000" pitchFamily="2" charset="2"/>
+              <a:buChar char="§"/>
+            </a:pPr>
+            <a:r>
+              <a:rPr lang="de-DE"/>
+              <a:t>Kunst</a:t>
+            </a:r>
+          </a:p>
+          <a:p>
+            <a:pPr marL="800100" lvl="1" indent="-342900" algn="l">
+              <a:buFont typeface="Wingdings" panose="05000000000000000000" pitchFamily="2" charset="2"/>
+              <a:buChar char="§"/>
+            </a:pPr>
+            <a:r>
+              <a:rPr lang="de-DE"/>
+              <a:t>Musik</a:t>
+            </a:r>
+          </a:p>
+          <a:p>
+            <a:pPr marL="800100" lvl="1" indent="-342900" algn="l">
+              <a:buFont typeface="Wingdings" panose="05000000000000000000" pitchFamily="2" charset="2"/>
+              <a:buChar char="§"/>
+            </a:pPr>
+            <a:r>
+              <a:rPr lang="de-DE"/>
+              <a:t>Animation</a:t>
+            </a:r>
+          </a:p>
+          <a:p>
+            <a:pPr marL="800100" lvl="1" indent="-342900" algn="l">
+              <a:buFont typeface="Wingdings" panose="05000000000000000000" pitchFamily="2" charset="2"/>
+              <a:buChar char="§"/>
+            </a:pPr>
+            <a:r>
+              <a:rPr lang="de-DE"/>
+              <a:t>Architektur</a:t>
             </a:r>
             <a:endParaRPr lang="de-DE" dirty="0"/>
+          </a:p>
+        </p:txBody>
+      </p:sp>
+      <p:pic>
+        <p:nvPicPr>
+          <p:cNvPr id="5" name="Grafik 4" descr="Ein Bild, das Entwurf, Zeichnung, Lineart, Strichzeichnung enthält.&#10;&#10;Automatisch generierte Beschreibung">
+            <a:extLst>
+              <a:ext uri="{FF2B5EF4-FFF2-40B4-BE49-F238E27FC236}">
+                <a16:creationId xmlns:a16="http://schemas.microsoft.com/office/drawing/2014/main" id="{8FC753EC-E126-4730-9904-2CD7F5FF1A59}"/>
+              </a:ext>
+            </a:extLst>
+          </p:cNvPr>
+          <p:cNvPicPr>
+            <a:picLocks noChangeAspect="1"/>
+          </p:cNvPicPr>
+          <p:nvPr/>
+        </p:nvPicPr>
+        <p:blipFill>
+          <a:blip r:embed="rId2">
+            <a:extLst>
+              <a:ext uri="{28A0092B-C50C-407E-A947-70E740481C1C}">
+                <a14:useLocalDpi xmlns:a14="http://schemas.microsoft.com/office/drawing/2010/main" val="0"/>
+              </a:ext>
+            </a:extLst>
+          </a:blip>
+          <a:stretch>
+            <a:fillRect/>
+          </a:stretch>
+        </p:blipFill>
+        <p:spPr>
+          <a:xfrm>
+            <a:off x="6917925" y="2987588"/>
+            <a:ext cx="5274075" cy="3814846"/>
+          </a:xfrm>
+          <a:prstGeom prst="rect">
+            <a:avLst/>
+          </a:prstGeom>
+        </p:spPr>
+      </p:pic>
+      <p:sp>
+        <p:nvSpPr>
+          <p:cNvPr id="6" name="Foliennummernplatzhalter 5">
+            <a:extLst>
+              <a:ext uri="{FF2B5EF4-FFF2-40B4-BE49-F238E27FC236}">
+                <a16:creationId xmlns:a16="http://schemas.microsoft.com/office/drawing/2014/main" id="{F820B386-A715-30B9-5FF5-54619EC5B4E1}"/>
+              </a:ext>
+            </a:extLst>
+          </p:cNvPr>
+          <p:cNvSpPr>
+            <a:spLocks noGrp="1"/>
+          </p:cNvSpPr>
+          <p:nvPr>
+            <p:ph type="sldNum" sz="quarter" idx="12"/>
+          </p:nvPr>
+        </p:nvSpPr>
+        <p:spPr/>
+        <p:txBody>
+          <a:bodyPr/>
+          <a:lstStyle/>
+          <a:p>
+            <a:fld id="{33B5D9D1-2BFB-4A8A-9782-5B1549F4706E}" type="slidenum">
+              <a:rPr lang="de-DE" smtClean="0"/>
+              <a:t>3</a:t>
+            </a:fld>
+            <a:endParaRPr lang="de-DE"/>
           </a:p>
         </p:txBody>
       </p:sp>
     </p:spTree>
     <p:extLst>
       <p:ext uri="{BB962C8B-B14F-4D97-AF65-F5344CB8AC3E}">
-        <p14:creationId xmlns:p14="http://schemas.microsoft.com/office/powerpoint/2010/main" val="3657436050"/>
+        <p14:creationId xmlns:p14="http://schemas.microsoft.com/office/powerpoint/2010/main" val="593405552"/>
+      </p:ext>
+    </p:extLst>
+  </p:cSld>
+  <p:clrMapOvr>
+    <a:masterClrMapping/>
+  </p:clrMapOvr>
+</p:sld>
+</file>
+
+<file path=ppt/slides/slide4.xml><?xml version="1.0" encoding="utf-8"?>
+<p:sld xmlns:a="http://schemas.openxmlformats.org/drawingml/2006/main" xmlns:r="http://schemas.openxmlformats.org/officeDocument/2006/relationships" xmlns:p="http://schemas.openxmlformats.org/presentationml/2006/main">
+  <p:cSld>
+    <p:spTree>
+      <p:nvGrpSpPr>
+        <p:cNvPr id="1" name=""/>
+        <p:cNvGrpSpPr/>
+        <p:nvPr/>
+      </p:nvGrpSpPr>
+      <p:grpSpPr>
+        <a:xfrm>
+          <a:off x="0" y="0"/>
+          <a:ext cx="0" cy="0"/>
+          <a:chOff x="0" y="0"/>
+          <a:chExt cx="0" cy="0"/>
+        </a:xfrm>
+      </p:grpSpPr>
+      <p:pic>
+        <p:nvPicPr>
+          <p:cNvPr id="3074" name="Picture 2" descr="Fraktal – Wikipedia">
+            <a:extLst>
+              <a:ext uri="{FF2B5EF4-FFF2-40B4-BE49-F238E27FC236}">
+                <a16:creationId xmlns:a16="http://schemas.microsoft.com/office/drawing/2014/main" id="{B1F1CB11-B47F-5723-C0FC-CC78BF450596}"/>
+              </a:ext>
+            </a:extLst>
+          </p:cNvPr>
+          <p:cNvPicPr>
+            <a:picLocks noChangeAspect="1" noChangeArrowheads="1"/>
+          </p:cNvPicPr>
+          <p:nvPr/>
+        </p:nvPicPr>
+        <p:blipFill>
+          <a:blip r:embed="rId2">
+            <a:extLst>
+              <a:ext uri="{28A0092B-C50C-407E-A947-70E740481C1C}">
+                <a14:useLocalDpi xmlns:a14="http://schemas.microsoft.com/office/drawing/2010/main" val="0"/>
+              </a:ext>
+            </a:extLst>
+          </a:blip>
+          <a:srcRect/>
+          <a:stretch>
+            <a:fillRect/>
+          </a:stretch>
+        </p:blipFill>
+        <p:spPr bwMode="auto">
+          <a:xfrm rot="18124964">
+            <a:off x="7165642" y="2252500"/>
+            <a:ext cx="10785787" cy="8493365"/>
+          </a:xfrm>
+          <a:prstGeom prst="rect">
+            <a:avLst/>
+          </a:prstGeom>
+          <a:noFill/>
+          <a:effectLst/>
+          <a:extLst>
+            <a:ext uri="{909E8E84-426E-40DD-AFC4-6F175D3DCCD1}">
+              <a14:hiddenFill xmlns:a14="http://schemas.microsoft.com/office/drawing/2010/main">
+                <a:solidFill>
+                  <a:srgbClr val="FFFFFF"/>
+                </a:solidFill>
+              </a14:hiddenFill>
+            </a:ext>
+          </a:extLst>
+        </p:spPr>
+      </p:pic>
+      <p:sp>
+        <p:nvSpPr>
+          <p:cNvPr id="2" name="Titel 1">
+            <a:extLst>
+              <a:ext uri="{FF2B5EF4-FFF2-40B4-BE49-F238E27FC236}">
+                <a16:creationId xmlns:a16="http://schemas.microsoft.com/office/drawing/2014/main" id="{7F29FD84-05DE-5325-FE83-7838B9554882}"/>
+              </a:ext>
+            </a:extLst>
+          </p:cNvPr>
+          <p:cNvSpPr>
+            <a:spLocks noGrp="1"/>
+          </p:cNvSpPr>
+          <p:nvPr>
+            <p:ph type="ctrTitle"/>
+          </p:nvPr>
+        </p:nvSpPr>
+        <p:spPr>
+          <a:xfrm>
+            <a:off x="0" y="0"/>
+            <a:ext cx="12192000" cy="1000635"/>
+          </a:xfrm>
+        </p:spPr>
+        <p:txBody>
+          <a:bodyPr>
+            <a:normAutofit/>
+          </a:bodyPr>
+          <a:lstStyle/>
+          <a:p>
+            <a:pPr algn="l"/>
+            <a:r>
+              <a:rPr lang="de-DE" dirty="0">
+                <a:latin typeface="Montserrat" pitchFamily="2" charset="0"/>
+              </a:rPr>
+              <a:t>GESCHICHTE // URSPRÜNGE</a:t>
+            </a:r>
+          </a:p>
+        </p:txBody>
+      </p:sp>
+      <p:sp>
+        <p:nvSpPr>
+          <p:cNvPr id="3" name="Untertitel 2">
+            <a:extLst>
+              <a:ext uri="{FF2B5EF4-FFF2-40B4-BE49-F238E27FC236}">
+                <a16:creationId xmlns:a16="http://schemas.microsoft.com/office/drawing/2014/main" id="{05EE19FE-68A3-D7AE-54F3-04813356C8BE}"/>
+              </a:ext>
+            </a:extLst>
+          </p:cNvPr>
+          <p:cNvSpPr>
+            <a:spLocks noGrp="1"/>
+          </p:cNvSpPr>
+          <p:nvPr>
+            <p:ph type="subTitle" idx="1"/>
+          </p:nvPr>
+        </p:nvSpPr>
+        <p:spPr>
+          <a:xfrm>
+            <a:off x="218485" y="1100517"/>
+            <a:ext cx="11595887" cy="5602035"/>
+          </a:xfrm>
+        </p:spPr>
+        <p:txBody>
+          <a:bodyPr>
+            <a:normAutofit/>
+          </a:bodyPr>
+          <a:lstStyle/>
+          <a:p>
+            <a:pPr marL="342900" indent="-342900" algn="l">
+              <a:buFontTx/>
+              <a:buChar char="-"/>
+            </a:pPr>
+            <a:r>
+              <a:rPr lang="de-DE" dirty="0"/>
+              <a:t>Fraktale</a:t>
+            </a:r>
+          </a:p>
+          <a:p>
+            <a:pPr marL="342900" indent="-342900" algn="l">
+              <a:buFontTx/>
+              <a:buChar char="-"/>
+            </a:pPr>
+            <a:r>
+              <a:rPr lang="de-DE" dirty="0" err="1"/>
+              <a:t>Lindenmayer</a:t>
+            </a:r>
+            <a:r>
+              <a:rPr lang="de-DE" dirty="0"/>
+              <a:t>-System</a:t>
+            </a:r>
+          </a:p>
+          <a:p>
+            <a:pPr marL="342900" indent="-342900" algn="l">
+              <a:buFontTx/>
+              <a:buChar char="-"/>
+            </a:pPr>
+            <a:endParaRPr lang="de-DE" dirty="0"/>
+          </a:p>
+          <a:p>
+            <a:pPr marL="342900" indent="-342900" algn="l">
+              <a:buFontTx/>
+              <a:buChar char="-"/>
+            </a:pPr>
+            <a:endParaRPr lang="de-DE" dirty="0"/>
+          </a:p>
+          <a:p>
+            <a:pPr marL="342900" indent="-342900" algn="l">
+              <a:buFontTx/>
+              <a:buChar char="-"/>
+            </a:pPr>
+            <a:r>
+              <a:rPr lang="de-DE" dirty="0"/>
+              <a:t>Prozedurale Dungeon Generierung (Rogue 1980)</a:t>
+            </a:r>
+          </a:p>
+          <a:p>
+            <a:pPr marL="342900" indent="-342900" algn="l">
+              <a:buFontTx/>
+              <a:buChar char="-"/>
+            </a:pPr>
+            <a:r>
+              <a:rPr lang="de-DE" dirty="0"/>
+              <a:t>Weltraum Generierung (Elite 1984)</a:t>
+            </a:r>
+          </a:p>
+          <a:p>
+            <a:pPr marL="342900" indent="-342900" algn="l">
+              <a:buFontTx/>
+              <a:buChar char="-"/>
+            </a:pPr>
+            <a:endParaRPr lang="de-DE" dirty="0"/>
+          </a:p>
+        </p:txBody>
+      </p:sp>
+      <p:pic>
+        <p:nvPicPr>
+          <p:cNvPr id="3076" name="Picture 4" descr="Lindenmayer-System – Wikipedia">
+            <a:extLst>
+              <a:ext uri="{FF2B5EF4-FFF2-40B4-BE49-F238E27FC236}">
+                <a16:creationId xmlns:a16="http://schemas.microsoft.com/office/drawing/2014/main" id="{C2495B07-31DD-8664-9AF3-4D8A7B68B43C}"/>
+              </a:ext>
+            </a:extLst>
+          </p:cNvPr>
+          <p:cNvPicPr>
+            <a:picLocks noChangeAspect="1" noChangeArrowheads="1"/>
+          </p:cNvPicPr>
+          <p:nvPr/>
+        </p:nvPicPr>
+        <p:blipFill>
+          <a:blip r:embed="rId3">
+            <a:extLst>
+              <a:ext uri="{28A0092B-C50C-407E-A947-70E740481C1C}">
+                <a14:useLocalDpi xmlns:a14="http://schemas.microsoft.com/office/drawing/2010/main" val="0"/>
+              </a:ext>
+            </a:extLst>
+          </a:blip>
+          <a:srcRect/>
+          <a:stretch>
+            <a:fillRect/>
+          </a:stretch>
+        </p:blipFill>
+        <p:spPr bwMode="auto">
+          <a:xfrm>
+            <a:off x="3876539" y="1000635"/>
+            <a:ext cx="3135908" cy="1838426"/>
+          </a:xfrm>
+          <a:prstGeom prst="rect">
+            <a:avLst/>
+          </a:prstGeom>
+          <a:noFill/>
+          <a:extLst>
+            <a:ext uri="{909E8E84-426E-40DD-AFC4-6F175D3DCCD1}">
+              <a14:hiddenFill xmlns:a14="http://schemas.microsoft.com/office/drawing/2010/main">
+                <a:solidFill>
+                  <a:srgbClr val="FFFFFF"/>
+                </a:solidFill>
+              </a14:hiddenFill>
+            </a:ext>
+          </a:extLst>
+        </p:spPr>
+      </p:pic>
+      <p:pic>
+        <p:nvPicPr>
+          <p:cNvPr id="3078" name="Picture 6" descr="Rogue (Computerspiel) – Wikipedia">
+            <a:extLst>
+              <a:ext uri="{FF2B5EF4-FFF2-40B4-BE49-F238E27FC236}">
+                <a16:creationId xmlns:a16="http://schemas.microsoft.com/office/drawing/2014/main" id="{B9A8284B-6E8C-20AC-498D-1A3CF935D151}"/>
+              </a:ext>
+            </a:extLst>
+          </p:cNvPr>
+          <p:cNvPicPr>
+            <a:picLocks noChangeAspect="1" noChangeArrowheads="1"/>
+          </p:cNvPicPr>
+          <p:nvPr/>
+        </p:nvPicPr>
+        <p:blipFill>
+          <a:blip r:embed="rId4">
+            <a:extLst>
+              <a:ext uri="{28A0092B-C50C-407E-A947-70E740481C1C}">
+                <a14:useLocalDpi xmlns:a14="http://schemas.microsoft.com/office/drawing/2010/main" val="0"/>
+              </a:ext>
+            </a:extLst>
+          </a:blip>
+          <a:srcRect/>
+          <a:stretch>
+            <a:fillRect/>
+          </a:stretch>
+        </p:blipFill>
+        <p:spPr bwMode="auto">
+          <a:xfrm>
+            <a:off x="3879681" y="3892170"/>
+            <a:ext cx="3017205" cy="1757273"/>
+          </a:xfrm>
+          <a:prstGeom prst="rect">
+            <a:avLst/>
+          </a:prstGeom>
+          <a:noFill/>
+          <a:extLst>
+            <a:ext uri="{909E8E84-426E-40DD-AFC4-6F175D3DCCD1}">
+              <a14:hiddenFill xmlns:a14="http://schemas.microsoft.com/office/drawing/2010/main">
+                <a:solidFill>
+                  <a:srgbClr val="FFFFFF"/>
+                </a:solidFill>
+              </a14:hiddenFill>
+            </a:ext>
+          </a:extLst>
+        </p:spPr>
+      </p:pic>
+      <p:pic>
+        <p:nvPicPr>
+          <p:cNvPr id="3082" name="Picture 10" descr="Elite (1984) - Elite Dangerous - Spiele - Frontier Store">
+            <a:extLst>
+              <a:ext uri="{FF2B5EF4-FFF2-40B4-BE49-F238E27FC236}">
+                <a16:creationId xmlns:a16="http://schemas.microsoft.com/office/drawing/2014/main" id="{ACAEA47A-550F-9780-02B7-916F5B07B69F}"/>
+              </a:ext>
+            </a:extLst>
+          </p:cNvPr>
+          <p:cNvPicPr>
+            <a:picLocks noChangeAspect="1" noChangeArrowheads="1"/>
+          </p:cNvPicPr>
+          <p:nvPr/>
+        </p:nvPicPr>
+        <p:blipFill>
+          <a:blip r:embed="rId5">
+            <a:extLst>
+              <a:ext uri="{28A0092B-C50C-407E-A947-70E740481C1C}">
+                <a14:useLocalDpi xmlns:a14="http://schemas.microsoft.com/office/drawing/2010/main" val="0"/>
+              </a:ext>
+            </a:extLst>
+          </a:blip>
+          <a:srcRect/>
+          <a:stretch>
+            <a:fillRect/>
+          </a:stretch>
+        </p:blipFill>
+        <p:spPr bwMode="auto">
+          <a:xfrm>
+            <a:off x="377628" y="3892170"/>
+            <a:ext cx="3115008" cy="1752192"/>
+          </a:xfrm>
+          <a:prstGeom prst="rect">
+            <a:avLst/>
+          </a:prstGeom>
+          <a:noFill/>
+          <a:extLst>
+            <a:ext uri="{909E8E84-426E-40DD-AFC4-6F175D3DCCD1}">
+              <a14:hiddenFill xmlns:a14="http://schemas.microsoft.com/office/drawing/2010/main">
+                <a:solidFill>
+                  <a:srgbClr val="FFFFFF"/>
+                </a:solidFill>
+              </a14:hiddenFill>
+            </a:ext>
+          </a:extLst>
+        </p:spPr>
+      </p:pic>
+      <p:sp>
+        <p:nvSpPr>
+          <p:cNvPr id="4" name="Foliennummernplatzhalter 3">
+            <a:extLst>
+              <a:ext uri="{FF2B5EF4-FFF2-40B4-BE49-F238E27FC236}">
+                <a16:creationId xmlns:a16="http://schemas.microsoft.com/office/drawing/2014/main" id="{5A694CA8-AF0A-879B-4EB2-816C731E1506}"/>
+              </a:ext>
+            </a:extLst>
+          </p:cNvPr>
+          <p:cNvSpPr>
+            <a:spLocks noGrp="1"/>
+          </p:cNvSpPr>
+          <p:nvPr>
+            <p:ph type="sldNum" sz="quarter" idx="12"/>
+          </p:nvPr>
+        </p:nvSpPr>
+        <p:spPr/>
+        <p:txBody>
+          <a:bodyPr/>
+          <a:lstStyle/>
+          <a:p>
+            <a:fld id="{33B5D9D1-2BFB-4A8A-9782-5B1549F4706E}" type="slidenum">
+              <a:rPr lang="de-DE" smtClean="0"/>
+              <a:t>4</a:t>
+            </a:fld>
+            <a:endParaRPr lang="de-DE"/>
+          </a:p>
+        </p:txBody>
+      </p:sp>
+    </p:spTree>
+    <p:extLst>
+      <p:ext uri="{BB962C8B-B14F-4D97-AF65-F5344CB8AC3E}">
+        <p14:creationId xmlns:p14="http://schemas.microsoft.com/office/powerpoint/2010/main" val="3822072607"/>
+      </p:ext>
+    </p:extLst>
+  </p:cSld>
+  <p:clrMapOvr>
+    <a:masterClrMapping/>
+  </p:clrMapOvr>
+</p:sld>
+</file>
+
+<file path=ppt/slides/slide5.xml><?xml version="1.0" encoding="utf-8"?>
+<p:sld xmlns:a="http://schemas.openxmlformats.org/drawingml/2006/main" xmlns:r="http://schemas.openxmlformats.org/officeDocument/2006/relationships" xmlns:p="http://schemas.openxmlformats.org/presentationml/2006/main">
+  <p:cSld>
+    <p:spTree>
+      <p:nvGrpSpPr>
+        <p:cNvPr id="1" name=""/>
+        <p:cNvGrpSpPr/>
+        <p:nvPr/>
+      </p:nvGrpSpPr>
+      <p:grpSpPr>
+        <a:xfrm>
+          <a:off x="0" y="0"/>
+          <a:ext cx="0" cy="0"/>
+          <a:chOff x="0" y="0"/>
+          <a:chExt cx="0" cy="0"/>
+        </a:xfrm>
+      </p:grpSpPr>
+      <p:pic>
+        <p:nvPicPr>
+          <p:cNvPr id="4098" name="Picture 2" descr="Minecraft Java Edition Server mieten - EmeraldHost.de">
+            <a:extLst>
+              <a:ext uri="{FF2B5EF4-FFF2-40B4-BE49-F238E27FC236}">
+                <a16:creationId xmlns:a16="http://schemas.microsoft.com/office/drawing/2014/main" id="{85616C17-CDE9-3D51-9255-D1D75ABFF71C}"/>
+              </a:ext>
+            </a:extLst>
+          </p:cNvPr>
+          <p:cNvPicPr>
+            <a:picLocks noChangeAspect="1" noChangeArrowheads="1"/>
+          </p:cNvPicPr>
+          <p:nvPr/>
+        </p:nvPicPr>
+        <p:blipFill>
+          <a:blip r:embed="rId2">
+            <a:extLst>
+              <a:ext uri="{28A0092B-C50C-407E-A947-70E740481C1C}">
+                <a14:useLocalDpi xmlns:a14="http://schemas.microsoft.com/office/drawing/2010/main" val="0"/>
+              </a:ext>
+            </a:extLst>
+          </a:blip>
+          <a:srcRect/>
+          <a:stretch>
+            <a:fillRect/>
+          </a:stretch>
+        </p:blipFill>
+        <p:spPr bwMode="auto">
+          <a:xfrm>
+            <a:off x="4530922" y="-1"/>
+            <a:ext cx="12191998" cy="6857999"/>
+          </a:xfrm>
+          <a:prstGeom prst="rect">
+            <a:avLst/>
+          </a:prstGeom>
+          <a:noFill/>
+          <a:extLst>
+            <a:ext uri="{909E8E84-426E-40DD-AFC4-6F175D3DCCD1}">
+              <a14:hiddenFill xmlns:a14="http://schemas.microsoft.com/office/drawing/2010/main">
+                <a:solidFill>
+                  <a:srgbClr val="FFFFFF"/>
+                </a:solidFill>
+              </a14:hiddenFill>
+            </a:ext>
+          </a:extLst>
+        </p:spPr>
+      </p:pic>
+      <p:sp>
+        <p:nvSpPr>
+          <p:cNvPr id="6" name="Rechteck 5">
+            <a:extLst>
+              <a:ext uri="{FF2B5EF4-FFF2-40B4-BE49-F238E27FC236}">
+                <a16:creationId xmlns:a16="http://schemas.microsoft.com/office/drawing/2014/main" id="{94DA9F0B-1576-1372-5B47-EAF9F8F9F237}"/>
+              </a:ext>
+            </a:extLst>
+          </p:cNvPr>
+          <p:cNvSpPr/>
+          <p:nvPr/>
+        </p:nvSpPr>
+        <p:spPr>
+          <a:xfrm rot="739573">
+            <a:off x="1866507" y="-952108"/>
+            <a:ext cx="6212264" cy="8762214"/>
+          </a:xfrm>
+          <a:prstGeom prst="rect">
+            <a:avLst/>
+          </a:prstGeom>
+          <a:solidFill>
+            <a:schemeClr val="bg1"/>
+          </a:solidFill>
+          <a:ln>
+            <a:solidFill>
+              <a:schemeClr val="bg1"/>
+            </a:solidFill>
+          </a:ln>
+        </p:spPr>
+        <p:style>
+          <a:lnRef idx="2">
+            <a:schemeClr val="accent1">
+              <a:shade val="15000"/>
+            </a:schemeClr>
+          </a:lnRef>
+          <a:fillRef idx="1">
+            <a:schemeClr val="accent1"/>
+          </a:fillRef>
+          <a:effectRef idx="0">
+            <a:schemeClr val="accent1"/>
+          </a:effectRef>
+          <a:fontRef idx="minor">
+            <a:schemeClr val="lt1"/>
+          </a:fontRef>
+        </p:style>
+        <p:txBody>
+          <a:bodyPr rtlCol="0" anchor="ctr"/>
+          <a:lstStyle/>
+          <a:p>
+            <a:pPr algn="ctr"/>
+            <a:endParaRPr lang="de-DE"/>
+          </a:p>
+        </p:txBody>
+      </p:sp>
+      <p:sp>
+        <p:nvSpPr>
+          <p:cNvPr id="2" name="Titel 1">
+            <a:extLst>
+              <a:ext uri="{FF2B5EF4-FFF2-40B4-BE49-F238E27FC236}">
+                <a16:creationId xmlns:a16="http://schemas.microsoft.com/office/drawing/2014/main" id="{7F29FD84-05DE-5325-FE83-7838B9554882}"/>
+              </a:ext>
+            </a:extLst>
+          </p:cNvPr>
+          <p:cNvSpPr>
+            <a:spLocks noGrp="1"/>
+          </p:cNvSpPr>
+          <p:nvPr>
+            <p:ph type="ctrTitle"/>
+          </p:nvPr>
+        </p:nvSpPr>
+        <p:spPr>
+          <a:xfrm>
+            <a:off x="0" y="0"/>
+            <a:ext cx="12192000" cy="1000635"/>
+          </a:xfrm>
+        </p:spPr>
+        <p:txBody>
+          <a:bodyPr/>
+          <a:lstStyle/>
+          <a:p>
+            <a:pPr algn="l"/>
+            <a:r>
+              <a:rPr lang="de-DE" dirty="0">
+                <a:latin typeface="Montserrat" pitchFamily="2" charset="0"/>
+              </a:rPr>
+              <a:t>GRUNDPRINZIPIEN</a:t>
+            </a:r>
+          </a:p>
+        </p:txBody>
+      </p:sp>
+      <p:sp>
+        <p:nvSpPr>
+          <p:cNvPr id="3" name="Untertitel 2">
+            <a:extLst>
+              <a:ext uri="{FF2B5EF4-FFF2-40B4-BE49-F238E27FC236}">
+                <a16:creationId xmlns:a16="http://schemas.microsoft.com/office/drawing/2014/main" id="{05EE19FE-68A3-D7AE-54F3-04813356C8BE}"/>
+              </a:ext>
+            </a:extLst>
+          </p:cNvPr>
+          <p:cNvSpPr>
+            <a:spLocks noGrp="1"/>
+          </p:cNvSpPr>
+          <p:nvPr>
+            <p:ph type="subTitle" idx="1"/>
+          </p:nvPr>
+        </p:nvSpPr>
+        <p:spPr>
+          <a:xfrm>
+            <a:off x="218485" y="1100517"/>
+            <a:ext cx="11595887" cy="5397387"/>
+          </a:xfrm>
+        </p:spPr>
+        <p:txBody>
+          <a:bodyPr>
+            <a:normAutofit lnSpcReduction="10000"/>
+          </a:bodyPr>
+          <a:lstStyle/>
+          <a:p>
+            <a:pPr marL="342900" indent="-342900" algn="l">
+              <a:buFont typeface="Wingdings" panose="05000000000000000000" pitchFamily="2" charset="2"/>
+              <a:buChar char="§"/>
+            </a:pPr>
+            <a:r>
+              <a:rPr lang="de-DE" dirty="0"/>
+              <a:t>Zufälligkeiten</a:t>
+            </a:r>
+          </a:p>
+          <a:p>
+            <a:pPr marL="342900" indent="-342900" algn="l">
+              <a:buFont typeface="Wingdings" panose="05000000000000000000" pitchFamily="2" charset="2"/>
+              <a:buChar char="§"/>
+            </a:pPr>
+            <a:r>
+              <a:rPr lang="de-DE" dirty="0"/>
+              <a:t>Algorithmen &gt;&gt; Regeln für Zufälligkeiten</a:t>
+            </a:r>
+          </a:p>
+          <a:p>
+            <a:pPr marL="342900" indent="-342900" algn="l">
+              <a:buFont typeface="Wingdings" panose="05000000000000000000" pitchFamily="2" charset="2"/>
+              <a:buChar char="§"/>
+            </a:pPr>
+            <a:endParaRPr lang="de-DE" dirty="0"/>
+          </a:p>
+          <a:p>
+            <a:pPr marL="342900" indent="-342900" algn="l">
+              <a:buFont typeface="Wingdings" panose="05000000000000000000" pitchFamily="2" charset="2"/>
+              <a:buChar char="§"/>
+            </a:pPr>
+            <a:r>
+              <a:rPr lang="de-DE" dirty="0"/>
+              <a:t>Seeds</a:t>
+            </a:r>
+          </a:p>
+          <a:p>
+            <a:pPr marL="800100" lvl="1" indent="-342900" algn="l">
+              <a:buFont typeface="Wingdings" panose="05000000000000000000" pitchFamily="2" charset="2"/>
+              <a:buChar char="§"/>
+            </a:pPr>
+            <a:r>
+              <a:rPr lang="de-DE" dirty="0"/>
+              <a:t>Was?</a:t>
+            </a:r>
+          </a:p>
+          <a:p>
+            <a:pPr marL="800100" lvl="1" indent="-342900" algn="l">
+              <a:buFont typeface="Wingdings" panose="05000000000000000000" pitchFamily="2" charset="2"/>
+              <a:buChar char="§"/>
+            </a:pPr>
+            <a:r>
+              <a:rPr lang="de-DE" dirty="0"/>
+              <a:t>Reproduzierbarkeit</a:t>
+            </a:r>
+          </a:p>
+          <a:p>
+            <a:pPr marL="800100" lvl="1" indent="-342900" algn="l">
+              <a:buFont typeface="Wingdings" panose="05000000000000000000" pitchFamily="2" charset="2"/>
+              <a:buChar char="§"/>
+            </a:pPr>
+            <a:r>
+              <a:rPr lang="de-DE" dirty="0"/>
+              <a:t>Konsistenz</a:t>
+            </a:r>
+          </a:p>
+          <a:p>
+            <a:pPr marL="800100" lvl="1" indent="-342900" algn="l">
+              <a:buFont typeface="Wingdings" panose="05000000000000000000" pitchFamily="2" charset="2"/>
+              <a:buChar char="§"/>
+            </a:pPr>
+            <a:endParaRPr lang="de-DE" dirty="0"/>
+          </a:p>
+          <a:p>
+            <a:pPr marL="342900" indent="-342900" algn="l">
+              <a:buFont typeface="Wingdings" panose="05000000000000000000" pitchFamily="2" charset="2"/>
+              <a:buChar char="§"/>
+            </a:pPr>
+            <a:r>
+              <a:rPr lang="de-DE" dirty="0"/>
+              <a:t>Zufall oder Kontrolle</a:t>
+            </a:r>
+          </a:p>
+          <a:p>
+            <a:pPr marL="342900" indent="-342900" algn="l">
+              <a:buFont typeface="Wingdings" panose="05000000000000000000" pitchFamily="2" charset="2"/>
+              <a:buChar char="§"/>
+            </a:pPr>
+            <a:endParaRPr lang="de-DE" dirty="0"/>
+          </a:p>
+          <a:p>
+            <a:pPr marL="342900" indent="-342900" algn="l">
+              <a:buFont typeface="Wingdings" panose="05000000000000000000" pitchFamily="2" charset="2"/>
+              <a:buChar char="§"/>
+            </a:pPr>
+            <a:r>
+              <a:rPr lang="de-DE" dirty="0"/>
+              <a:t>Praktisch Unendliche Vielfalt</a:t>
+            </a:r>
+          </a:p>
+          <a:p>
+            <a:pPr marL="342900" indent="-342900" algn="l">
+              <a:buFont typeface="Wingdings" panose="05000000000000000000" pitchFamily="2" charset="2"/>
+              <a:buChar char="§"/>
+            </a:pPr>
+            <a:endParaRPr lang="de-DE" dirty="0"/>
+          </a:p>
+          <a:p>
+            <a:pPr marL="342900" indent="-342900" algn="l">
+              <a:buFont typeface="Wingdings" panose="05000000000000000000" pitchFamily="2" charset="2"/>
+              <a:buChar char="§"/>
+            </a:pPr>
+            <a:r>
+              <a:rPr lang="de-DE" dirty="0"/>
+              <a:t>Effizienz</a:t>
+            </a:r>
+          </a:p>
+          <a:p>
+            <a:pPr lvl="1" algn="l"/>
+            <a:endParaRPr lang="de-DE" dirty="0"/>
+          </a:p>
+        </p:txBody>
+      </p:sp>
+      <p:sp>
+        <p:nvSpPr>
+          <p:cNvPr id="7" name="Foliennummernplatzhalter 6">
+            <a:extLst>
+              <a:ext uri="{FF2B5EF4-FFF2-40B4-BE49-F238E27FC236}">
+                <a16:creationId xmlns:a16="http://schemas.microsoft.com/office/drawing/2014/main" id="{46B202EF-4E51-5900-17BB-BD07BFCC8816}"/>
+              </a:ext>
+            </a:extLst>
+          </p:cNvPr>
+          <p:cNvSpPr>
+            <a:spLocks noGrp="1"/>
+          </p:cNvSpPr>
+          <p:nvPr>
+            <p:ph type="sldNum" sz="quarter" idx="12"/>
+          </p:nvPr>
+        </p:nvSpPr>
+        <p:spPr/>
+        <p:txBody>
+          <a:bodyPr/>
+          <a:lstStyle/>
+          <a:p>
+            <a:fld id="{33B5D9D1-2BFB-4A8A-9782-5B1549F4706E}" type="slidenum">
+              <a:rPr lang="de-DE" smtClean="0"/>
+              <a:t>5</a:t>
+            </a:fld>
+            <a:endParaRPr lang="de-DE"/>
+          </a:p>
+        </p:txBody>
+      </p:sp>
+    </p:spTree>
+    <p:extLst>
+      <p:ext uri="{BB962C8B-B14F-4D97-AF65-F5344CB8AC3E}">
+        <p14:creationId xmlns:p14="http://schemas.microsoft.com/office/powerpoint/2010/main" val="3300859010"/>
+      </p:ext>
+    </p:extLst>
+  </p:cSld>
+  <p:clrMapOvr>
+    <a:masterClrMapping/>
+  </p:clrMapOvr>
+</p:sld>
+</file>
+
+<file path=ppt/slides/slide6.xml><?xml version="1.0" encoding="utf-8"?>
+<p:sld xmlns:a="http://schemas.openxmlformats.org/drawingml/2006/main" xmlns:r="http://schemas.openxmlformats.org/officeDocument/2006/relationships" xmlns:p="http://schemas.openxmlformats.org/presentationml/2006/main">
+  <p:cSld>
+    <p:spTree>
+      <p:nvGrpSpPr>
+        <p:cNvPr id="1" name=""/>
+        <p:cNvGrpSpPr/>
+        <p:nvPr/>
+      </p:nvGrpSpPr>
+      <p:grpSpPr>
+        <a:xfrm>
+          <a:off x="0" y="0"/>
+          <a:ext cx="0" cy="0"/>
+          <a:chOff x="0" y="0"/>
+          <a:chExt cx="0" cy="0"/>
+        </a:xfrm>
+      </p:grpSpPr>
+      <p:pic>
+        <p:nvPicPr>
+          <p:cNvPr id="5" name="Grafik 4" descr="Ein Bild, das draußen, Himmel, Astronomisches Objekt, Natur enthält.&#10;&#10;Automatisch generierte Beschreibung">
+            <a:extLst>
+              <a:ext uri="{FF2B5EF4-FFF2-40B4-BE49-F238E27FC236}">
+                <a16:creationId xmlns:a16="http://schemas.microsoft.com/office/drawing/2014/main" id="{AE96F92E-A829-0004-60FD-F9FB31822F5A}"/>
+              </a:ext>
+            </a:extLst>
+          </p:cNvPr>
+          <p:cNvPicPr>
+            <a:picLocks noChangeAspect="1"/>
+          </p:cNvPicPr>
+          <p:nvPr/>
+        </p:nvPicPr>
+        <p:blipFill>
+          <a:blip r:embed="rId3">
+            <a:extLst>
+              <a:ext uri="{28A0092B-C50C-407E-A947-70E740481C1C}">
+                <a14:useLocalDpi xmlns:a14="http://schemas.microsoft.com/office/drawing/2010/main" val="0"/>
+              </a:ext>
+            </a:extLst>
+          </a:blip>
+          <a:stretch>
+            <a:fillRect/>
+          </a:stretch>
+        </p:blipFill>
+        <p:spPr>
+          <a:xfrm>
+            <a:off x="4391664" y="0"/>
+            <a:ext cx="12192000" cy="6858000"/>
+          </a:xfrm>
+          <a:prstGeom prst="rect">
+            <a:avLst/>
+          </a:prstGeom>
+        </p:spPr>
+      </p:pic>
+      <p:sp>
+        <p:nvSpPr>
+          <p:cNvPr id="6" name="Rechteck 5">
+            <a:extLst>
+              <a:ext uri="{FF2B5EF4-FFF2-40B4-BE49-F238E27FC236}">
+                <a16:creationId xmlns:a16="http://schemas.microsoft.com/office/drawing/2014/main" id="{94DA9F0B-1576-1372-5B47-EAF9F8F9F237}"/>
+              </a:ext>
+            </a:extLst>
+          </p:cNvPr>
+          <p:cNvSpPr/>
+          <p:nvPr/>
+        </p:nvSpPr>
+        <p:spPr>
+          <a:xfrm rot="739573">
+            <a:off x="3411735" y="-952109"/>
+            <a:ext cx="6212264" cy="8762214"/>
+          </a:xfrm>
+          <a:prstGeom prst="rect">
+            <a:avLst/>
+          </a:prstGeom>
+          <a:solidFill>
+            <a:schemeClr val="bg1"/>
+          </a:solidFill>
+          <a:ln>
+            <a:solidFill>
+              <a:schemeClr val="bg1"/>
+            </a:solidFill>
+          </a:ln>
+        </p:spPr>
+        <p:style>
+          <a:lnRef idx="2">
+            <a:schemeClr val="accent1">
+              <a:shade val="15000"/>
+            </a:schemeClr>
+          </a:lnRef>
+          <a:fillRef idx="1">
+            <a:schemeClr val="accent1"/>
+          </a:fillRef>
+          <a:effectRef idx="0">
+            <a:schemeClr val="accent1"/>
+          </a:effectRef>
+          <a:fontRef idx="minor">
+            <a:schemeClr val="lt1"/>
+          </a:fontRef>
+        </p:style>
+        <p:txBody>
+          <a:bodyPr rtlCol="0" anchor="ctr"/>
+          <a:lstStyle/>
+          <a:p>
+            <a:pPr algn="ctr"/>
+            <a:endParaRPr lang="de-DE"/>
+          </a:p>
+        </p:txBody>
+      </p:sp>
+      <p:sp>
+        <p:nvSpPr>
+          <p:cNvPr id="2" name="Titel 1">
+            <a:extLst>
+              <a:ext uri="{FF2B5EF4-FFF2-40B4-BE49-F238E27FC236}">
+                <a16:creationId xmlns:a16="http://schemas.microsoft.com/office/drawing/2014/main" id="{7F29FD84-05DE-5325-FE83-7838B9554882}"/>
+              </a:ext>
+            </a:extLst>
+          </p:cNvPr>
+          <p:cNvSpPr>
+            <a:spLocks noGrp="1"/>
+          </p:cNvSpPr>
+          <p:nvPr>
+            <p:ph type="ctrTitle"/>
+          </p:nvPr>
+        </p:nvSpPr>
+        <p:spPr>
+          <a:xfrm>
+            <a:off x="0" y="0"/>
+            <a:ext cx="12192000" cy="1000635"/>
+          </a:xfrm>
+        </p:spPr>
+        <p:txBody>
+          <a:bodyPr/>
+          <a:lstStyle/>
+          <a:p>
+            <a:pPr algn="l"/>
+            <a:r>
+              <a:rPr lang="de-DE" dirty="0">
+                <a:latin typeface="Montserrat" pitchFamily="2" charset="0"/>
+              </a:rPr>
+              <a:t>TECHNIKEN</a:t>
+            </a:r>
+          </a:p>
+        </p:txBody>
+      </p:sp>
+      <p:sp>
+        <p:nvSpPr>
+          <p:cNvPr id="3" name="Untertitel 2">
+            <a:extLst>
+              <a:ext uri="{FF2B5EF4-FFF2-40B4-BE49-F238E27FC236}">
+                <a16:creationId xmlns:a16="http://schemas.microsoft.com/office/drawing/2014/main" id="{05EE19FE-68A3-D7AE-54F3-04813356C8BE}"/>
+              </a:ext>
+            </a:extLst>
+          </p:cNvPr>
+          <p:cNvSpPr>
+            <a:spLocks noGrp="1"/>
+          </p:cNvSpPr>
+          <p:nvPr>
+            <p:ph type="subTitle" idx="1"/>
+          </p:nvPr>
+        </p:nvSpPr>
+        <p:spPr>
+          <a:xfrm>
+            <a:off x="218485" y="1100517"/>
+            <a:ext cx="11595887" cy="5397387"/>
+          </a:xfrm>
+        </p:spPr>
+        <p:txBody>
+          <a:bodyPr>
+            <a:normAutofit/>
+          </a:bodyPr>
+          <a:lstStyle/>
+          <a:p>
+            <a:pPr marL="342900" indent="-342900" algn="l">
+              <a:buFont typeface="Wingdings" panose="05000000000000000000" pitchFamily="2" charset="2"/>
+              <a:buChar char="§"/>
+            </a:pPr>
+            <a:r>
+              <a:rPr lang="de-DE" dirty="0"/>
+              <a:t>Ken </a:t>
+            </a:r>
+            <a:r>
+              <a:rPr lang="de-DE" dirty="0" err="1"/>
+              <a:t>Perlin‘s</a:t>
+            </a:r>
+            <a:r>
+              <a:rPr lang="de-DE" dirty="0"/>
+              <a:t> </a:t>
+            </a:r>
+            <a:r>
+              <a:rPr lang="de-DE" dirty="0" err="1"/>
+              <a:t>Perlin</a:t>
+            </a:r>
+            <a:r>
+              <a:rPr lang="de-DE" dirty="0"/>
+              <a:t> Noise</a:t>
+            </a:r>
+          </a:p>
+          <a:p>
+            <a:pPr marL="342900" indent="-342900" algn="l">
+              <a:buFont typeface="Wingdings" panose="05000000000000000000" pitchFamily="2" charset="2"/>
+              <a:buChar char="§"/>
+            </a:pPr>
+            <a:r>
+              <a:rPr lang="de-DE" dirty="0"/>
+              <a:t>Benoît </a:t>
+            </a:r>
+            <a:r>
+              <a:rPr lang="de-DE" dirty="0" err="1"/>
+              <a:t>Mandelbrot‘s</a:t>
+            </a:r>
+            <a:r>
+              <a:rPr lang="de-DE" dirty="0"/>
+              <a:t> Fraktale </a:t>
+            </a:r>
+          </a:p>
+          <a:p>
+            <a:pPr marL="342900" indent="-342900" algn="l">
+              <a:buFont typeface="Wingdings" panose="05000000000000000000" pitchFamily="2" charset="2"/>
+              <a:buChar char="§"/>
+            </a:pPr>
+            <a:r>
+              <a:rPr lang="de-DE" dirty="0"/>
+              <a:t>Astrid </a:t>
+            </a:r>
+            <a:r>
+              <a:rPr lang="de-DE" dirty="0" err="1"/>
+              <a:t>Lindenmeyer‘s</a:t>
+            </a:r>
+            <a:r>
+              <a:rPr lang="de-DE" dirty="0"/>
+              <a:t> L-System</a:t>
+            </a:r>
+          </a:p>
+          <a:p>
+            <a:pPr marL="342900" indent="-342900" algn="l">
+              <a:buFont typeface="Wingdings" panose="05000000000000000000" pitchFamily="2" charset="2"/>
+              <a:buChar char="§"/>
+            </a:pPr>
+            <a:endParaRPr lang="de-DE" dirty="0"/>
+          </a:p>
+          <a:p>
+            <a:pPr marL="342900" indent="-342900" algn="l">
+              <a:buFont typeface="Wingdings" panose="05000000000000000000" pitchFamily="2" charset="2"/>
+              <a:buChar char="§"/>
+            </a:pPr>
+            <a:r>
+              <a:rPr lang="de-DE" dirty="0"/>
+              <a:t>Prozedurale Generierung</a:t>
+            </a:r>
+          </a:p>
+          <a:p>
+            <a:pPr marL="342900" indent="-342900" algn="l">
+              <a:buFont typeface="Wingdings" panose="05000000000000000000" pitchFamily="2" charset="2"/>
+              <a:buChar char="§"/>
+            </a:pPr>
+            <a:r>
+              <a:rPr lang="de-DE" dirty="0"/>
+              <a:t>Prozedurale Texturen</a:t>
+            </a:r>
+          </a:p>
+          <a:p>
+            <a:pPr marL="342900" indent="-342900" algn="l">
+              <a:buFont typeface="Wingdings" panose="05000000000000000000" pitchFamily="2" charset="2"/>
+              <a:buChar char="§"/>
+            </a:pPr>
+            <a:r>
+              <a:rPr lang="de-DE" dirty="0"/>
+              <a:t>Prozedurale Modelle</a:t>
+            </a:r>
+          </a:p>
+          <a:p>
+            <a:pPr marL="342900" indent="-342900" algn="l">
+              <a:buFont typeface="Wingdings" panose="05000000000000000000" pitchFamily="2" charset="2"/>
+              <a:buChar char="§"/>
+            </a:pPr>
+            <a:endParaRPr lang="de-DE" dirty="0"/>
+          </a:p>
+          <a:p>
+            <a:pPr marL="342900" indent="-342900" algn="l">
+              <a:buFont typeface="Wingdings" panose="05000000000000000000" pitchFamily="2" charset="2"/>
+              <a:buChar char="§"/>
+            </a:pPr>
+            <a:r>
+              <a:rPr lang="de-DE" dirty="0"/>
+              <a:t>Pseudo-Zufallszahlen</a:t>
+            </a:r>
+          </a:p>
+        </p:txBody>
+      </p:sp>
+      <p:pic>
+        <p:nvPicPr>
+          <p:cNvPr id="5124" name="Picture 4" descr="The World Generation of Minecraft - Alan Zucconi">
+            <a:extLst>
+              <a:ext uri="{FF2B5EF4-FFF2-40B4-BE49-F238E27FC236}">
+                <a16:creationId xmlns:a16="http://schemas.microsoft.com/office/drawing/2014/main" id="{F57A789A-01AB-6602-E4DE-9C08758B7C8C}"/>
+              </a:ext>
+            </a:extLst>
+          </p:cNvPr>
+          <p:cNvPicPr>
+            <a:picLocks noChangeAspect="1" noChangeArrowheads="1"/>
+          </p:cNvPicPr>
+          <p:nvPr/>
+        </p:nvPicPr>
+        <p:blipFill>
+          <a:blip r:embed="rId4">
+            <a:extLst>
+              <a:ext uri="{28A0092B-C50C-407E-A947-70E740481C1C}">
+                <a14:useLocalDpi xmlns:a14="http://schemas.microsoft.com/office/drawing/2010/main" val="0"/>
+              </a:ext>
+            </a:extLst>
+          </a:blip>
+          <a:srcRect/>
+          <a:stretch>
+            <a:fillRect/>
+          </a:stretch>
+        </p:blipFill>
+        <p:spPr bwMode="auto">
+          <a:xfrm>
+            <a:off x="5553075" y="241069"/>
+            <a:ext cx="5393840" cy="3033333"/>
+          </a:xfrm>
+          <a:prstGeom prst="rect">
+            <a:avLst/>
+          </a:prstGeom>
+          <a:noFill/>
+          <a:extLst>
+            <a:ext uri="{909E8E84-426E-40DD-AFC4-6F175D3DCCD1}">
+              <a14:hiddenFill xmlns:a14="http://schemas.microsoft.com/office/drawing/2010/main">
+                <a:solidFill>
+                  <a:srgbClr val="FFFFFF"/>
+                </a:solidFill>
+              </a14:hiddenFill>
+            </a:ext>
+          </a:extLst>
+        </p:spPr>
+      </p:pic>
+      <p:pic>
+        <p:nvPicPr>
+          <p:cNvPr id="5126" name="Picture 6" descr="No Man's Sky has received an update with expanded base building and organic  frigates | Gagadget.com">
+            <a:extLst>
+              <a:ext uri="{FF2B5EF4-FFF2-40B4-BE49-F238E27FC236}">
+                <a16:creationId xmlns:a16="http://schemas.microsoft.com/office/drawing/2014/main" id="{0E998CC0-59F2-150C-BED7-08DDD9C78065}"/>
+              </a:ext>
+            </a:extLst>
+          </p:cNvPr>
+          <p:cNvPicPr>
+            <a:picLocks noChangeAspect="1" noChangeArrowheads="1"/>
+          </p:cNvPicPr>
+          <p:nvPr/>
+        </p:nvPicPr>
+        <p:blipFill>
+          <a:blip r:embed="rId5">
+            <a:extLst>
+              <a:ext uri="{28A0092B-C50C-407E-A947-70E740481C1C}">
+                <a14:useLocalDpi xmlns:a14="http://schemas.microsoft.com/office/drawing/2010/main" val="0"/>
+              </a:ext>
+            </a:extLst>
+          </a:blip>
+          <a:srcRect/>
+          <a:stretch>
+            <a:fillRect/>
+          </a:stretch>
+        </p:blipFill>
+        <p:spPr bwMode="auto">
+          <a:xfrm>
+            <a:off x="5553075" y="3700139"/>
+            <a:ext cx="5393840" cy="3034035"/>
+          </a:xfrm>
+          <a:prstGeom prst="rect">
+            <a:avLst/>
+          </a:prstGeom>
+          <a:noFill/>
+          <a:extLst>
+            <a:ext uri="{909E8E84-426E-40DD-AFC4-6F175D3DCCD1}">
+              <a14:hiddenFill xmlns:a14="http://schemas.microsoft.com/office/drawing/2010/main">
+                <a:solidFill>
+                  <a:srgbClr val="FFFFFF"/>
+                </a:solidFill>
+              </a14:hiddenFill>
+            </a:ext>
+          </a:extLst>
+        </p:spPr>
+      </p:pic>
+      <p:sp>
+        <p:nvSpPr>
+          <p:cNvPr id="7" name="Foliennummernplatzhalter 6">
+            <a:extLst>
+              <a:ext uri="{FF2B5EF4-FFF2-40B4-BE49-F238E27FC236}">
+                <a16:creationId xmlns:a16="http://schemas.microsoft.com/office/drawing/2014/main" id="{0CFE9E84-4FE2-43DD-BA05-4433119D0F3D}"/>
+              </a:ext>
+            </a:extLst>
+          </p:cNvPr>
+          <p:cNvSpPr>
+            <a:spLocks noGrp="1"/>
+          </p:cNvSpPr>
+          <p:nvPr>
+            <p:ph type="sldNum" sz="quarter" idx="12"/>
+          </p:nvPr>
+        </p:nvSpPr>
+        <p:spPr/>
+        <p:txBody>
+          <a:bodyPr/>
+          <a:lstStyle/>
+          <a:p>
+            <a:fld id="{33B5D9D1-2BFB-4A8A-9782-5B1549F4706E}" type="slidenum">
+              <a:rPr lang="de-DE" smtClean="0"/>
+              <a:t>6</a:t>
+            </a:fld>
+            <a:endParaRPr lang="de-DE"/>
+          </a:p>
+        </p:txBody>
+      </p:sp>
+    </p:spTree>
+    <p:extLst>
+      <p:ext uri="{BB962C8B-B14F-4D97-AF65-F5344CB8AC3E}">
+        <p14:creationId xmlns:p14="http://schemas.microsoft.com/office/powerpoint/2010/main" val="1526776515"/>
+      </p:ext>
+    </p:extLst>
+  </p:cSld>
+  <p:clrMapOvr>
+    <a:masterClrMapping/>
+  </p:clrMapOvr>
+</p:sld>
+</file>
+
+<file path=ppt/slides/slide7.xml><?xml version="1.0" encoding="utf-8"?>
+<p:sld xmlns:a="http://schemas.openxmlformats.org/drawingml/2006/main" xmlns:r="http://schemas.openxmlformats.org/officeDocument/2006/relationships" xmlns:p="http://schemas.openxmlformats.org/presentationml/2006/main">
+  <p:cSld>
+    <p:spTree>
+      <p:nvGrpSpPr>
+        <p:cNvPr id="1" name=""/>
+        <p:cNvGrpSpPr/>
+        <p:nvPr/>
+      </p:nvGrpSpPr>
+      <p:grpSpPr>
+        <a:xfrm>
+          <a:off x="0" y="0"/>
+          <a:ext cx="0" cy="0"/>
+          <a:chOff x="0" y="0"/>
+          <a:chExt cx="0" cy="0"/>
+        </a:xfrm>
+      </p:grpSpPr>
+      <p:pic>
+        <p:nvPicPr>
+          <p:cNvPr id="6150" name="Picture 6" descr="Searching For Bugs In Code Or Technology 3d Render Stock Photo - Download  Image Now - Debugging, Computer, Virus - iStock">
+            <a:extLst>
+              <a:ext uri="{FF2B5EF4-FFF2-40B4-BE49-F238E27FC236}">
+                <a16:creationId xmlns:a16="http://schemas.microsoft.com/office/drawing/2014/main" id="{E0AFFB64-E72E-BF4B-E498-3CD5B14F7A86}"/>
+              </a:ext>
+            </a:extLst>
+          </p:cNvPr>
+          <p:cNvPicPr>
+            <a:picLocks noChangeAspect="1" noChangeArrowheads="1"/>
+          </p:cNvPicPr>
+          <p:nvPr/>
+        </p:nvPicPr>
+        <p:blipFill>
+          <a:blip r:embed="rId3">
+            <a:extLst>
+              <a:ext uri="{28A0092B-C50C-407E-A947-70E740481C1C}">
+                <a14:useLocalDpi xmlns:a14="http://schemas.microsoft.com/office/drawing/2010/main" val="0"/>
+              </a:ext>
+            </a:extLst>
+          </a:blip>
+          <a:srcRect/>
+          <a:stretch>
+            <a:fillRect/>
+          </a:stretch>
+        </p:blipFill>
+        <p:spPr bwMode="auto">
+          <a:xfrm>
+            <a:off x="4256927" y="4980"/>
+            <a:ext cx="12192000" cy="6853020"/>
+          </a:xfrm>
+          <a:prstGeom prst="rect">
+            <a:avLst/>
+          </a:prstGeom>
+          <a:noFill/>
+          <a:extLst>
+            <a:ext uri="{909E8E84-426E-40DD-AFC4-6F175D3DCCD1}">
+              <a14:hiddenFill xmlns:a14="http://schemas.microsoft.com/office/drawing/2010/main">
+                <a:solidFill>
+                  <a:srgbClr val="FFFFFF"/>
+                </a:solidFill>
+              </a14:hiddenFill>
+            </a:ext>
+          </a:extLst>
+        </p:spPr>
+      </p:pic>
+      <p:sp>
+        <p:nvSpPr>
+          <p:cNvPr id="6" name="Rechteck 5">
+            <a:extLst>
+              <a:ext uri="{FF2B5EF4-FFF2-40B4-BE49-F238E27FC236}">
+                <a16:creationId xmlns:a16="http://schemas.microsoft.com/office/drawing/2014/main" id="{94DA9F0B-1576-1372-5B47-EAF9F8F9F237}"/>
+              </a:ext>
+            </a:extLst>
+          </p:cNvPr>
+          <p:cNvSpPr/>
+          <p:nvPr/>
+        </p:nvSpPr>
+        <p:spPr>
+          <a:xfrm rot="739573">
+            <a:off x="3461260" y="-1021933"/>
+            <a:ext cx="6843109" cy="8762214"/>
+          </a:xfrm>
+          <a:prstGeom prst="rect">
+            <a:avLst/>
+          </a:prstGeom>
+          <a:solidFill>
+            <a:schemeClr val="bg1"/>
+          </a:solidFill>
+          <a:ln>
+            <a:solidFill>
+              <a:schemeClr val="bg1"/>
+            </a:solidFill>
+          </a:ln>
+        </p:spPr>
+        <p:style>
+          <a:lnRef idx="2">
+            <a:schemeClr val="accent1">
+              <a:shade val="15000"/>
+            </a:schemeClr>
+          </a:lnRef>
+          <a:fillRef idx="1">
+            <a:schemeClr val="accent1"/>
+          </a:fillRef>
+          <a:effectRef idx="0">
+            <a:schemeClr val="accent1"/>
+          </a:effectRef>
+          <a:fontRef idx="minor">
+            <a:schemeClr val="lt1"/>
+          </a:fontRef>
+        </p:style>
+        <p:txBody>
+          <a:bodyPr rtlCol="0" anchor="ctr"/>
+          <a:lstStyle/>
+          <a:p>
+            <a:pPr algn="ctr"/>
+            <a:endParaRPr lang="de-DE"/>
+          </a:p>
+        </p:txBody>
+      </p:sp>
+      <p:sp>
+        <p:nvSpPr>
+          <p:cNvPr id="2" name="Titel 1">
+            <a:extLst>
+              <a:ext uri="{FF2B5EF4-FFF2-40B4-BE49-F238E27FC236}">
+                <a16:creationId xmlns:a16="http://schemas.microsoft.com/office/drawing/2014/main" id="{7F29FD84-05DE-5325-FE83-7838B9554882}"/>
+              </a:ext>
+            </a:extLst>
+          </p:cNvPr>
+          <p:cNvSpPr>
+            <a:spLocks noGrp="1"/>
+          </p:cNvSpPr>
+          <p:nvPr>
+            <p:ph type="ctrTitle"/>
+          </p:nvPr>
+        </p:nvSpPr>
+        <p:spPr>
+          <a:xfrm>
+            <a:off x="0" y="0"/>
+            <a:ext cx="12192000" cy="1000635"/>
+          </a:xfrm>
+        </p:spPr>
+        <p:txBody>
+          <a:bodyPr>
+            <a:normAutofit fontScale="90000"/>
+          </a:bodyPr>
+          <a:lstStyle/>
+          <a:p>
+            <a:pPr algn="l"/>
+            <a:r>
+              <a:rPr lang="de-DE" dirty="0">
+                <a:latin typeface="Montserrat" pitchFamily="2" charset="0"/>
+              </a:rPr>
+              <a:t>GRENZEN // SCHWIERIGKEITEN</a:t>
+            </a:r>
+          </a:p>
+        </p:txBody>
+      </p:sp>
+      <p:sp>
+        <p:nvSpPr>
+          <p:cNvPr id="3" name="Untertitel 2">
+            <a:extLst>
+              <a:ext uri="{FF2B5EF4-FFF2-40B4-BE49-F238E27FC236}">
+                <a16:creationId xmlns:a16="http://schemas.microsoft.com/office/drawing/2014/main" id="{05EE19FE-68A3-D7AE-54F3-04813356C8BE}"/>
+              </a:ext>
+            </a:extLst>
+          </p:cNvPr>
+          <p:cNvSpPr>
+            <a:spLocks noGrp="1"/>
+          </p:cNvSpPr>
+          <p:nvPr>
+            <p:ph type="subTitle" idx="1"/>
+          </p:nvPr>
+        </p:nvSpPr>
+        <p:spPr>
+          <a:xfrm>
+            <a:off x="218485" y="1100517"/>
+            <a:ext cx="11595887" cy="5397387"/>
+          </a:xfrm>
+        </p:spPr>
+        <p:txBody>
+          <a:bodyPr>
+            <a:normAutofit/>
+          </a:bodyPr>
+          <a:lstStyle/>
+          <a:p>
+            <a:pPr marL="342900" indent="-342900" algn="l">
+              <a:buFont typeface="Wingdings" panose="05000000000000000000" pitchFamily="2" charset="2"/>
+              <a:buChar char="§"/>
+            </a:pPr>
+            <a:r>
+              <a:rPr lang="de-DE" dirty="0"/>
+              <a:t>Zufälligkeit vs. Kohärenz</a:t>
+            </a:r>
+          </a:p>
+          <a:p>
+            <a:pPr marL="800100" lvl="1" indent="-342900" algn="l">
+              <a:buFont typeface="Wingdings" panose="05000000000000000000" pitchFamily="2" charset="2"/>
+              <a:buChar char="§"/>
+            </a:pPr>
+            <a:r>
+              <a:rPr lang="de-DE" dirty="0"/>
+              <a:t>Nutzbar oder Chaotisch</a:t>
+            </a:r>
+          </a:p>
+          <a:p>
+            <a:pPr marL="342900" indent="-342900" algn="l">
+              <a:buFont typeface="Wingdings" panose="05000000000000000000" pitchFamily="2" charset="2"/>
+              <a:buChar char="§"/>
+            </a:pPr>
+            <a:endParaRPr lang="de-DE" dirty="0"/>
+          </a:p>
+          <a:p>
+            <a:pPr marL="342900" indent="-342900" algn="l">
+              <a:buFont typeface="Wingdings" panose="05000000000000000000" pitchFamily="2" charset="2"/>
+              <a:buChar char="§"/>
+            </a:pPr>
+            <a:r>
+              <a:rPr lang="de-DE" dirty="0"/>
+              <a:t>Echtzeit- vs. Vorab-Generierung</a:t>
+            </a:r>
+          </a:p>
+          <a:p>
+            <a:pPr marL="800100" lvl="1" indent="-342900" algn="l">
+              <a:buFont typeface="Wingdings" panose="05000000000000000000" pitchFamily="2" charset="2"/>
+              <a:buChar char="§"/>
+            </a:pPr>
+            <a:r>
+              <a:rPr lang="de-DE" dirty="0"/>
+              <a:t>Level </a:t>
+            </a:r>
+            <a:r>
+              <a:rPr lang="de-DE" dirty="0" err="1"/>
+              <a:t>of</a:t>
+            </a:r>
+            <a:r>
+              <a:rPr lang="de-DE" dirty="0"/>
+              <a:t> Detail</a:t>
+            </a:r>
+          </a:p>
+          <a:p>
+            <a:pPr marL="800100" lvl="1" indent="-342900" algn="l">
+              <a:buFont typeface="Wingdings" panose="05000000000000000000" pitchFamily="2" charset="2"/>
+              <a:buChar char="§"/>
+            </a:pPr>
+            <a:endParaRPr lang="de-DE" dirty="0"/>
+          </a:p>
+          <a:p>
+            <a:pPr marL="342900" indent="-342900" algn="l">
+              <a:buFont typeface="Wingdings" panose="05000000000000000000" pitchFamily="2" charset="2"/>
+              <a:buChar char="§"/>
+            </a:pPr>
+            <a:r>
+              <a:rPr lang="de-DE" dirty="0"/>
+              <a:t>Begrenzte Kreativität durch Regeln</a:t>
+            </a:r>
+          </a:p>
+          <a:p>
+            <a:pPr marL="800100" lvl="1" indent="-342900" algn="l">
+              <a:buFont typeface="Wingdings" panose="05000000000000000000" pitchFamily="2" charset="2"/>
+              <a:buChar char="§"/>
+            </a:pPr>
+            <a:r>
+              <a:rPr lang="de-DE" dirty="0"/>
+              <a:t>Mehr Regeln = Mehr Begrenzungen</a:t>
+            </a:r>
+          </a:p>
+          <a:p>
+            <a:pPr marL="342900" indent="-342900" algn="l">
+              <a:buFont typeface="Wingdings" panose="05000000000000000000" pitchFamily="2" charset="2"/>
+              <a:buChar char="§"/>
+            </a:pPr>
+            <a:endParaRPr lang="de-DE" dirty="0"/>
+          </a:p>
+          <a:p>
+            <a:pPr marL="342900" indent="-342900" algn="l">
+              <a:buFont typeface="Wingdings" panose="05000000000000000000" pitchFamily="2" charset="2"/>
+              <a:buChar char="§"/>
+            </a:pPr>
+            <a:r>
+              <a:rPr lang="de-DE" dirty="0"/>
+              <a:t>Testen und Debuggen</a:t>
+            </a:r>
+          </a:p>
+          <a:p>
+            <a:pPr marL="800100" lvl="1" indent="-342900" algn="l">
+              <a:buFont typeface="Wingdings" panose="05000000000000000000" pitchFamily="2" charset="2"/>
+              <a:buChar char="§"/>
+            </a:pPr>
+            <a:r>
+              <a:rPr lang="de-DE" dirty="0"/>
+              <a:t>Reproduzierbarkeit durch Seeds</a:t>
+            </a:r>
+          </a:p>
+        </p:txBody>
+      </p:sp>
+      <p:pic>
+        <p:nvPicPr>
+          <p:cNvPr id="6146" name="Picture 2" descr="How building data works: Level of Detail | by 3DBuildings | Medium">
+            <a:extLst>
+              <a:ext uri="{FF2B5EF4-FFF2-40B4-BE49-F238E27FC236}">
+                <a16:creationId xmlns:a16="http://schemas.microsoft.com/office/drawing/2014/main" id="{7EF2F5CC-9E51-8A29-FE60-15FA9449B346}"/>
+              </a:ext>
+            </a:extLst>
+          </p:cNvPr>
+          <p:cNvPicPr>
+            <a:picLocks noChangeAspect="1" noChangeArrowheads="1"/>
+          </p:cNvPicPr>
+          <p:nvPr/>
+        </p:nvPicPr>
+        <p:blipFill>
+          <a:blip r:embed="rId4">
+            <a:extLst>
+              <a:ext uri="{28A0092B-C50C-407E-A947-70E740481C1C}">
+                <a14:useLocalDpi xmlns:a14="http://schemas.microsoft.com/office/drawing/2010/main" val="0"/>
+              </a:ext>
+            </a:extLst>
+          </a:blip>
+          <a:srcRect/>
+          <a:stretch>
+            <a:fillRect/>
+          </a:stretch>
+        </p:blipFill>
+        <p:spPr bwMode="auto">
+          <a:xfrm>
+            <a:off x="5554099" y="3876792"/>
+            <a:ext cx="4504284" cy="2252142"/>
+          </a:xfrm>
+          <a:prstGeom prst="rect">
+            <a:avLst/>
+          </a:prstGeom>
+          <a:noFill/>
+          <a:extLst>
+            <a:ext uri="{909E8E84-426E-40DD-AFC4-6F175D3DCCD1}">
+              <a14:hiddenFill xmlns:a14="http://schemas.microsoft.com/office/drawing/2010/main">
+                <a:solidFill>
+                  <a:srgbClr val="FFFFFF"/>
+                </a:solidFill>
+              </a14:hiddenFill>
+            </a:ext>
+          </a:extLst>
+        </p:spPr>
+      </p:pic>
+      <p:pic>
+        <p:nvPicPr>
+          <p:cNvPr id="6148" name="Picture 4" descr="Spiky ball wallpaper - 3D wallpapers - #26430">
+            <a:extLst>
+              <a:ext uri="{FF2B5EF4-FFF2-40B4-BE49-F238E27FC236}">
+                <a16:creationId xmlns:a16="http://schemas.microsoft.com/office/drawing/2014/main" id="{5B6A0213-4551-096D-08A6-21A5B2F084CF}"/>
+              </a:ext>
+            </a:extLst>
+          </p:cNvPr>
+          <p:cNvPicPr>
+            <a:picLocks noChangeAspect="1" noChangeArrowheads="1"/>
+          </p:cNvPicPr>
+          <p:nvPr/>
+        </p:nvPicPr>
+        <p:blipFill>
+          <a:blip r:embed="rId5">
+            <a:extLst>
+              <a:ext uri="{28A0092B-C50C-407E-A947-70E740481C1C}">
+                <a14:useLocalDpi xmlns:a14="http://schemas.microsoft.com/office/drawing/2010/main" val="0"/>
+              </a:ext>
+            </a:extLst>
+          </a:blip>
+          <a:srcRect/>
+          <a:stretch>
+            <a:fillRect/>
+          </a:stretch>
+        </p:blipFill>
+        <p:spPr bwMode="auto">
+          <a:xfrm>
+            <a:off x="5554117" y="1095747"/>
+            <a:ext cx="4504266" cy="2533650"/>
+          </a:xfrm>
+          <a:prstGeom prst="rect">
+            <a:avLst/>
+          </a:prstGeom>
+          <a:noFill/>
+          <a:extLst>
+            <a:ext uri="{909E8E84-426E-40DD-AFC4-6F175D3DCCD1}">
+              <a14:hiddenFill xmlns:a14="http://schemas.microsoft.com/office/drawing/2010/main">
+                <a:solidFill>
+                  <a:srgbClr val="FFFFFF"/>
+                </a:solidFill>
+              </a14:hiddenFill>
+            </a:ext>
+          </a:extLst>
+        </p:spPr>
+      </p:pic>
+      <p:sp>
+        <p:nvSpPr>
+          <p:cNvPr id="4" name="Foliennummernplatzhalter 3">
+            <a:extLst>
+              <a:ext uri="{FF2B5EF4-FFF2-40B4-BE49-F238E27FC236}">
+                <a16:creationId xmlns:a16="http://schemas.microsoft.com/office/drawing/2014/main" id="{157FFC66-B28D-DFFB-2476-B4328F2D866C}"/>
+              </a:ext>
+            </a:extLst>
+          </p:cNvPr>
+          <p:cNvSpPr>
+            <a:spLocks noGrp="1"/>
+          </p:cNvSpPr>
+          <p:nvPr>
+            <p:ph type="sldNum" sz="quarter" idx="12"/>
+          </p:nvPr>
+        </p:nvSpPr>
+        <p:spPr/>
+        <p:txBody>
+          <a:bodyPr/>
+          <a:lstStyle/>
+          <a:p>
+            <a:fld id="{33B5D9D1-2BFB-4A8A-9782-5B1549F4706E}" type="slidenum">
+              <a:rPr lang="de-DE" smtClean="0"/>
+              <a:t>7</a:t>
+            </a:fld>
+            <a:endParaRPr lang="de-DE"/>
+          </a:p>
+        </p:txBody>
+      </p:sp>
+    </p:spTree>
+    <p:extLst>
+      <p:ext uri="{BB962C8B-B14F-4D97-AF65-F5344CB8AC3E}">
+        <p14:creationId xmlns:p14="http://schemas.microsoft.com/office/powerpoint/2010/main" val="1890151202"/>
+      </p:ext>
+    </p:extLst>
+  </p:cSld>
+  <p:clrMapOvr>
+    <a:masterClrMapping/>
+  </p:clrMapOvr>
+</p:sld>
+</file>
+
+<file path=ppt/slides/slide8.xml><?xml version="1.0" encoding="utf-8"?>
+<p:sld xmlns:a="http://schemas.openxmlformats.org/drawingml/2006/main" xmlns:r="http://schemas.openxmlformats.org/officeDocument/2006/relationships" xmlns:p="http://schemas.openxmlformats.org/presentationml/2006/main">
+  <p:cSld>
+    <p:spTree>
+      <p:nvGrpSpPr>
+        <p:cNvPr id="1" name=""/>
+        <p:cNvGrpSpPr/>
+        <p:nvPr/>
+      </p:nvGrpSpPr>
+      <p:grpSpPr>
+        <a:xfrm>
+          <a:off x="0" y="0"/>
+          <a:ext cx="0" cy="0"/>
+          <a:chOff x="0" y="0"/>
+          <a:chExt cx="0" cy="0"/>
+        </a:xfrm>
+      </p:grpSpPr>
+      <p:sp>
+        <p:nvSpPr>
+          <p:cNvPr id="2" name="Titel 1">
+            <a:extLst>
+              <a:ext uri="{FF2B5EF4-FFF2-40B4-BE49-F238E27FC236}">
+                <a16:creationId xmlns:a16="http://schemas.microsoft.com/office/drawing/2014/main" id="{7F29FD84-05DE-5325-FE83-7838B9554882}"/>
+              </a:ext>
+            </a:extLst>
+          </p:cNvPr>
+          <p:cNvSpPr>
+            <a:spLocks noGrp="1"/>
+          </p:cNvSpPr>
+          <p:nvPr>
+            <p:ph type="ctrTitle"/>
+          </p:nvPr>
+        </p:nvSpPr>
+        <p:spPr/>
+        <p:txBody>
+          <a:bodyPr/>
+          <a:lstStyle/>
+          <a:p>
+            <a:r>
+              <a:rPr lang="de-DE" dirty="0">
+                <a:latin typeface="Montserrat" pitchFamily="2" charset="0"/>
+              </a:rPr>
+              <a:t>Fragen ?</a:t>
+            </a:r>
+          </a:p>
+        </p:txBody>
+      </p:sp>
+      <p:sp>
+        <p:nvSpPr>
+          <p:cNvPr id="6" name="Foliennummernplatzhalter 5">
+            <a:extLst>
+              <a:ext uri="{FF2B5EF4-FFF2-40B4-BE49-F238E27FC236}">
+                <a16:creationId xmlns:a16="http://schemas.microsoft.com/office/drawing/2014/main" id="{B4C5EF77-A408-F3FD-9ACB-55DA6FC215FF}"/>
+              </a:ext>
+            </a:extLst>
+          </p:cNvPr>
+          <p:cNvSpPr>
+            <a:spLocks noGrp="1"/>
+          </p:cNvSpPr>
+          <p:nvPr>
+            <p:ph type="sldNum" sz="quarter" idx="12"/>
+          </p:nvPr>
+        </p:nvSpPr>
+        <p:spPr/>
+        <p:txBody>
+          <a:bodyPr/>
+          <a:lstStyle/>
+          <a:p>
+            <a:fld id="{33B5D9D1-2BFB-4A8A-9782-5B1549F4706E}" type="slidenum">
+              <a:rPr lang="de-DE" smtClean="0"/>
+              <a:t>8</a:t>
+            </a:fld>
+            <a:endParaRPr lang="de-DE"/>
+          </a:p>
+        </p:txBody>
+      </p:sp>
+    </p:spTree>
+    <p:extLst>
+      <p:ext uri="{BB962C8B-B14F-4D97-AF65-F5344CB8AC3E}">
+        <p14:creationId xmlns:p14="http://schemas.microsoft.com/office/powerpoint/2010/main" val="3857641824"/>
       </p:ext>
     </p:extLst>
   </p:cSld>
@@ -3870,4 +6447,319 @@
     </a:ext>
   </a:extLst>
 </a:theme>
+</file>
+
+<file path=ppt/theme/theme2.xml><?xml version="1.0" encoding="utf-8"?>
+<a:theme xmlns:a="http://schemas.openxmlformats.org/drawingml/2006/main" name="Office">
+  <a:themeElements>
+    <a:clrScheme name="Office">
+      <a:dk1>
+        <a:sysClr val="windowText" lastClr="000000"/>
+      </a:dk1>
+      <a:lt1>
+        <a:sysClr val="window" lastClr="FFFFFF"/>
+      </a:lt1>
+      <a:dk2>
+        <a:srgbClr val="0E2841"/>
+      </a:dk2>
+      <a:lt2>
+        <a:srgbClr val="E8E8E8"/>
+      </a:lt2>
+      <a:accent1>
+        <a:srgbClr val="156082"/>
+      </a:accent1>
+      <a:accent2>
+        <a:srgbClr val="E97132"/>
+      </a:accent2>
+      <a:accent3>
+        <a:srgbClr val="196B24"/>
+      </a:accent3>
+      <a:accent4>
+        <a:srgbClr val="0F9ED5"/>
+      </a:accent4>
+      <a:accent5>
+        <a:srgbClr val="A02B93"/>
+      </a:accent5>
+      <a:accent6>
+        <a:srgbClr val="4EA72E"/>
+      </a:accent6>
+      <a:hlink>
+        <a:srgbClr val="467886"/>
+      </a:hlink>
+      <a:folHlink>
+        <a:srgbClr val="96607D"/>
+      </a:folHlink>
+    </a:clrScheme>
+    <a:fontScheme name="Office">
+      <a:majorFont>
+        <a:latin typeface="Aptos Display" panose="02110004020202020204"/>
+        <a:ea typeface=""/>
+        <a:cs typeface=""/>
+        <a:font script="Jpan" typeface="游ゴシック Light"/>
+        <a:font script="Hang" typeface="맑은 고딕"/>
+        <a:font script="Hans" typeface="等线 Light"/>
+        <a:font script="Hant" typeface="新細明體"/>
+        <a:font script="Arab" typeface="Times New Roman"/>
+        <a:font script="Hebr" typeface="Times New Roman"/>
+        <a:font script="Thai" typeface="Angsana New"/>
+        <a:font script="Ethi" typeface="Nyala"/>
+        <a:font script="Beng" typeface="Vrinda"/>
+        <a:font script="Gujr" typeface="Shruti"/>
+        <a:font script="Khmr" typeface="MoolBoran"/>
+        <a:font script="Knda" typeface="Tunga"/>
+        <a:font script="Guru" typeface="Raavi"/>
+        <a:font script="Cans" typeface="Euphemia"/>
+        <a:font script="Cher" typeface="Plantagenet Cherokee"/>
+        <a:font script="Yiii" typeface="Microsoft Yi Baiti"/>
+        <a:font script="Tibt" typeface="Microsoft Himalaya"/>
+        <a:font script="Thaa" typeface="MV Boli"/>
+        <a:font script="Deva" typeface="Mangal"/>
+        <a:font script="Telu" typeface="Gautami"/>
+        <a:font script="Taml" typeface="Latha"/>
+        <a:font script="Syrc" typeface="Estrangelo Edessa"/>
+        <a:font script="Orya" typeface="Kalinga"/>
+        <a:font script="Mlym" typeface="Kartika"/>
+        <a:font script="Laoo" typeface="DokChampa"/>
+        <a:font script="Sinh" typeface="Iskoola Pota"/>
+        <a:font script="Mong" typeface="Mongolian Baiti"/>
+        <a:font script="Viet" typeface="Times New Roman"/>
+        <a:font script="Uigh" typeface="Microsoft Uighur"/>
+        <a:font script="Geor" typeface="Sylfaen"/>
+        <a:font script="Armn" typeface="Arial"/>
+        <a:font script="Bugi" typeface="Leelawadee UI"/>
+        <a:font script="Bopo" typeface="Microsoft JhengHei"/>
+        <a:font script="Java" typeface="Javanese Text"/>
+        <a:font script="Lisu" typeface="Segoe UI"/>
+        <a:font script="Mymr" typeface="Myanmar Text"/>
+        <a:font script="Nkoo" typeface="Ebrima"/>
+        <a:font script="Olck" typeface="Nirmala UI"/>
+        <a:font script="Osma" typeface="Ebrima"/>
+        <a:font script="Phag" typeface="Phagspa"/>
+        <a:font script="Syrn" typeface="Estrangelo Edessa"/>
+        <a:font script="Syrj" typeface="Estrangelo Edessa"/>
+        <a:font script="Syre" typeface="Estrangelo Edessa"/>
+        <a:font script="Sora" typeface="Nirmala UI"/>
+        <a:font script="Tale" typeface="Microsoft Tai Le"/>
+        <a:font script="Talu" typeface="Microsoft New Tai Lue"/>
+        <a:font script="Tfng" typeface="Ebrima"/>
+      </a:majorFont>
+      <a:minorFont>
+        <a:latin typeface="Aptos" panose="02110004020202020204"/>
+        <a:ea typeface=""/>
+        <a:cs typeface=""/>
+        <a:font script="Jpan" typeface="游ゴシック"/>
+        <a:font script="Hang" typeface="맑은 고딕"/>
+        <a:font script="Hans" typeface="等线"/>
+        <a:font script="Hant" typeface="新細明體"/>
+        <a:font script="Arab" typeface="Arial"/>
+        <a:font script="Hebr" typeface="Arial"/>
+        <a:font script="Thai" typeface="Cordia New"/>
+        <a:font script="Ethi" typeface="Nyala"/>
+        <a:font script="Beng" typeface="Vrinda"/>
+        <a:font script="Gujr" typeface="Shruti"/>
+        <a:font script="Khmr" typeface="DaunPenh"/>
+        <a:font script="Knda" typeface="Tunga"/>
+        <a:font script="Guru" typeface="Raavi"/>
+        <a:font script="Cans" typeface="Euphemia"/>
+        <a:font script="Cher" typeface="Plantagenet Cherokee"/>
+        <a:font script="Yiii" typeface="Microsoft Yi Baiti"/>
+        <a:font script="Tibt" typeface="Microsoft Himalaya"/>
+        <a:font script="Thaa" typeface="MV Boli"/>
+        <a:font script="Deva" typeface="Mangal"/>
+        <a:font script="Telu" typeface="Gautami"/>
+        <a:font script="Taml" typeface="Latha"/>
+        <a:font script="Syrc" typeface="Estrangelo Edessa"/>
+        <a:font script="Orya" typeface="Kalinga"/>
+        <a:font script="Mlym" typeface="Kartika"/>
+        <a:font script="Laoo" typeface="DokChampa"/>
+        <a:font script="Sinh" typeface="Iskoola Pota"/>
+        <a:font script="Mong" typeface="Mongolian Baiti"/>
+        <a:font script="Viet" typeface="Arial"/>
+        <a:font script="Uigh" typeface="Microsoft Uighur"/>
+        <a:font script="Geor" typeface="Sylfaen"/>
+        <a:font script="Armn" typeface="Arial"/>
+        <a:font script="Bugi" typeface="Leelawadee UI"/>
+        <a:font script="Bopo" typeface="Microsoft JhengHei"/>
+        <a:font script="Java" typeface="Javanese Text"/>
+        <a:font script="Lisu" typeface="Segoe UI"/>
+        <a:font script="Mymr" typeface="Myanmar Text"/>
+        <a:font script="Nkoo" typeface="Ebrima"/>
+        <a:font script="Olck" typeface="Nirmala UI"/>
+        <a:font script="Osma" typeface="Ebrima"/>
+        <a:font script="Phag" typeface="Phagspa"/>
+        <a:font script="Syrn" typeface="Estrangelo Edessa"/>
+        <a:font script="Syrj" typeface="Estrangelo Edessa"/>
+        <a:font script="Syre" typeface="Estrangelo Edessa"/>
+        <a:font script="Sora" typeface="Nirmala UI"/>
+        <a:font script="Tale" typeface="Microsoft Tai Le"/>
+        <a:font script="Talu" typeface="Microsoft New Tai Lue"/>
+        <a:font script="Tfng" typeface="Ebrima"/>
+      </a:minorFont>
+    </a:fontScheme>
+    <a:fmtScheme name="Office">
+      <a:fillStyleLst>
+        <a:solidFill>
+          <a:schemeClr val="phClr"/>
+        </a:solidFill>
+        <a:gradFill rotWithShape="1">
+          <a:gsLst>
+            <a:gs pos="0">
+              <a:schemeClr val="phClr">
+                <a:lumMod val="110000"/>
+                <a:satMod val="105000"/>
+                <a:tint val="67000"/>
+              </a:schemeClr>
+            </a:gs>
+            <a:gs pos="50000">
+              <a:schemeClr val="phClr">
+                <a:lumMod val="105000"/>
+                <a:satMod val="103000"/>
+                <a:tint val="73000"/>
+              </a:schemeClr>
+            </a:gs>
+            <a:gs pos="100000">
+              <a:schemeClr val="phClr">
+                <a:lumMod val="105000"/>
+                <a:satMod val="109000"/>
+                <a:tint val="81000"/>
+              </a:schemeClr>
+            </a:gs>
+          </a:gsLst>
+          <a:lin ang="5400000" scaled="0"/>
+        </a:gradFill>
+        <a:gradFill rotWithShape="1">
+          <a:gsLst>
+            <a:gs pos="0">
+              <a:schemeClr val="phClr">
+                <a:satMod val="103000"/>
+                <a:lumMod val="102000"/>
+                <a:tint val="94000"/>
+              </a:schemeClr>
+            </a:gs>
+            <a:gs pos="50000">
+              <a:schemeClr val="phClr">
+                <a:satMod val="110000"/>
+                <a:lumMod val="100000"/>
+                <a:shade val="100000"/>
+              </a:schemeClr>
+            </a:gs>
+            <a:gs pos="100000">
+              <a:schemeClr val="phClr">
+                <a:lumMod val="99000"/>
+                <a:satMod val="120000"/>
+                <a:shade val="78000"/>
+              </a:schemeClr>
+            </a:gs>
+          </a:gsLst>
+          <a:lin ang="5400000" scaled="0"/>
+        </a:gradFill>
+      </a:fillStyleLst>
+      <a:lnStyleLst>
+        <a:ln w="12700" cap="flat" cmpd="sng" algn="ctr">
+          <a:solidFill>
+            <a:schemeClr val="phClr"/>
+          </a:solidFill>
+          <a:prstDash val="solid"/>
+          <a:miter lim="800000"/>
+        </a:ln>
+        <a:ln w="19050" cap="flat" cmpd="sng" algn="ctr">
+          <a:solidFill>
+            <a:schemeClr val="phClr"/>
+          </a:solidFill>
+          <a:prstDash val="solid"/>
+          <a:miter lim="800000"/>
+        </a:ln>
+        <a:ln w="25400" cap="flat" cmpd="sng" algn="ctr">
+          <a:solidFill>
+            <a:schemeClr val="phClr"/>
+          </a:solidFill>
+          <a:prstDash val="solid"/>
+          <a:miter lim="800000"/>
+        </a:ln>
+      </a:lnStyleLst>
+      <a:effectStyleLst>
+        <a:effectStyle>
+          <a:effectLst/>
+        </a:effectStyle>
+        <a:effectStyle>
+          <a:effectLst/>
+        </a:effectStyle>
+        <a:effectStyle>
+          <a:effectLst>
+            <a:outerShdw blurRad="57150" dist="19050" dir="5400000" algn="ctr" rotWithShape="0">
+              <a:srgbClr val="000000">
+                <a:alpha val="63000"/>
+              </a:srgbClr>
+            </a:outerShdw>
+          </a:effectLst>
+        </a:effectStyle>
+      </a:effectStyleLst>
+      <a:bgFillStyleLst>
+        <a:solidFill>
+          <a:schemeClr val="phClr"/>
+        </a:solidFill>
+        <a:solidFill>
+          <a:schemeClr val="phClr">
+            <a:tint val="95000"/>
+            <a:satMod val="170000"/>
+          </a:schemeClr>
+        </a:solidFill>
+        <a:gradFill rotWithShape="1">
+          <a:gsLst>
+            <a:gs pos="0">
+              <a:schemeClr val="phClr">
+                <a:tint val="93000"/>
+                <a:satMod val="150000"/>
+                <a:shade val="98000"/>
+                <a:lumMod val="102000"/>
+              </a:schemeClr>
+            </a:gs>
+            <a:gs pos="50000">
+              <a:schemeClr val="phClr">
+                <a:tint val="98000"/>
+                <a:satMod val="130000"/>
+                <a:shade val="90000"/>
+                <a:lumMod val="103000"/>
+              </a:schemeClr>
+            </a:gs>
+            <a:gs pos="100000">
+              <a:schemeClr val="phClr">
+                <a:shade val="63000"/>
+                <a:satMod val="120000"/>
+              </a:schemeClr>
+            </a:gs>
+          </a:gsLst>
+          <a:lin ang="5400000" scaled="0"/>
+        </a:gradFill>
+      </a:bgFillStyleLst>
+    </a:fmtScheme>
+  </a:themeElements>
+  <a:objectDefaults>
+    <a:lnDef>
+      <a:spPr/>
+      <a:bodyPr/>
+      <a:lstStyle/>
+      <a:style>
+        <a:lnRef idx="2">
+          <a:schemeClr val="accent1"/>
+        </a:lnRef>
+        <a:fillRef idx="0">
+          <a:schemeClr val="accent1"/>
+        </a:fillRef>
+        <a:effectRef idx="1">
+          <a:schemeClr val="accent1"/>
+        </a:effectRef>
+        <a:fontRef idx="minor">
+          <a:schemeClr val="tx1"/>
+        </a:fontRef>
+      </a:style>
+    </a:lnDef>
+  </a:objectDefaults>
+  <a:extraClrSchemeLst/>
+  <a:extLst>
+    <a:ext uri="{05A4C25C-085E-4340-85A3-A5531E510DB2}">
+      <thm15:themeFamily xmlns:thm15="http://schemas.microsoft.com/office/thememl/2012/main" name="Office Theme" id="{2E142A2C-CD16-42D6-873A-C26D2A0506FA}" vid="{1BDDFF52-6CD6-40A5-AB3C-68EB2F1E4D0A}"/>
+    </a:ext>
+  </a:extLst>
+</a:theme>
 </file>
</xml_diff>